<commit_message>
add pending topic to ppt
</commit_message>
<xml_diff>
--- a/Asp.Net-2023.pptx
+++ b/Asp.Net-2023.pptx
@@ -215,6 +215,766 @@
 
 <file path=ppt/changesInfos/changesInfo1.xml><?xml version="1.0" encoding="utf-8"?>
 <pc:chgInfo xmlns:a="http://schemas.openxmlformats.org/drawingml/2006/main" xmlns:r="http://schemas.openxmlformats.org/officeDocument/2006/relationships" xmlns:ac="http://schemas.microsoft.com/office/drawing/2013/main/command" xmlns:pc="http://schemas.microsoft.com/office/powerpoint/2013/main/command">
+  <pc:docChgLst>
+    <pc:chgData name="Samer Hasan Al Khatib" userId="68b7a22b-a3eb-4e08-a61f-646d81823754" providerId="ADAL" clId="{9429BEAE-70A6-4AEE-A37D-2075488C87F1}"/>
+    <pc:docChg chg="undo custSel addSld delSld modSld sldOrd">
+      <pc:chgData name="Samer Hasan Al Khatib" userId="68b7a22b-a3eb-4e08-a61f-646d81823754" providerId="ADAL" clId="{9429BEAE-70A6-4AEE-A37D-2075488C87F1}" dt="2023-09-05T14:57:12.034" v="1127" actId="14100"/>
+      <pc:docMkLst>
+        <pc:docMk/>
+      </pc:docMkLst>
+      <pc:sldChg chg="modSp new mod">
+        <pc:chgData name="Samer Hasan Al Khatib" userId="68b7a22b-a3eb-4e08-a61f-646d81823754" providerId="ADAL" clId="{9429BEAE-70A6-4AEE-A37D-2075488C87F1}" dt="2023-09-01T13:44:29.626" v="5" actId="14100"/>
+        <pc:sldMkLst>
+          <pc:docMk/>
+          <pc:sldMk cId="1366119606" sldId="335"/>
+        </pc:sldMkLst>
+        <pc:spChg chg="mod">
+          <ac:chgData name="Samer Hasan Al Khatib" userId="68b7a22b-a3eb-4e08-a61f-646d81823754" providerId="ADAL" clId="{9429BEAE-70A6-4AEE-A37D-2075488C87F1}" dt="2023-09-01T13:44:26.467" v="4" actId="1076"/>
+          <ac:spMkLst>
+            <pc:docMk/>
+            <pc:sldMk cId="1366119606" sldId="335"/>
+            <ac:spMk id="2" creationId="{128484A4-CF23-2EFA-96F6-48F9DABBCEBE}"/>
+          </ac:spMkLst>
+        </pc:spChg>
+        <pc:spChg chg="mod">
+          <ac:chgData name="Samer Hasan Al Khatib" userId="68b7a22b-a3eb-4e08-a61f-646d81823754" providerId="ADAL" clId="{9429BEAE-70A6-4AEE-A37D-2075488C87F1}" dt="2023-09-01T13:44:29.626" v="5" actId="14100"/>
+          <ac:spMkLst>
+            <pc:docMk/>
+            <pc:sldMk cId="1366119606" sldId="335"/>
+            <ac:spMk id="3" creationId="{3E84297B-127A-7B94-4711-7E2F7EAC6427}"/>
+          </ac:spMkLst>
+        </pc:spChg>
+      </pc:sldChg>
+      <pc:sldChg chg="modSp new mod ord">
+        <pc:chgData name="Samer Hasan Al Khatib" userId="68b7a22b-a3eb-4e08-a61f-646d81823754" providerId="ADAL" clId="{9429BEAE-70A6-4AEE-A37D-2075488C87F1}" dt="2023-09-02T17:52:59.942" v="265"/>
+        <pc:sldMkLst>
+          <pc:docMk/>
+          <pc:sldMk cId="4266254586" sldId="336"/>
+        </pc:sldMkLst>
+        <pc:spChg chg="mod">
+          <ac:chgData name="Samer Hasan Al Khatib" userId="68b7a22b-a3eb-4e08-a61f-646d81823754" providerId="ADAL" clId="{9429BEAE-70A6-4AEE-A37D-2075488C87F1}" dt="2023-09-01T13:59:31.669" v="11" actId="27636"/>
+          <ac:spMkLst>
+            <pc:docMk/>
+            <pc:sldMk cId="4266254586" sldId="336"/>
+            <ac:spMk id="2" creationId="{CE63236D-0B0F-D43B-767A-C25DB4DEAC70}"/>
+          </ac:spMkLst>
+        </pc:spChg>
+        <pc:spChg chg="mod">
+          <ac:chgData name="Samer Hasan Al Khatib" userId="68b7a22b-a3eb-4e08-a61f-646d81823754" providerId="ADAL" clId="{9429BEAE-70A6-4AEE-A37D-2075488C87F1}" dt="2023-09-02T17:52:59.942" v="265"/>
+          <ac:spMkLst>
+            <pc:docMk/>
+            <pc:sldMk cId="4266254586" sldId="336"/>
+            <ac:spMk id="3" creationId="{9DB0BEFF-39BE-E31C-91DD-62E2FF873C22}"/>
+          </ac:spMkLst>
+        </pc:spChg>
+      </pc:sldChg>
+      <pc:sldChg chg="modSp new mod">
+        <pc:chgData name="Samer Hasan Al Khatib" userId="68b7a22b-a3eb-4e08-a61f-646d81823754" providerId="ADAL" clId="{9429BEAE-70A6-4AEE-A37D-2075488C87F1}" dt="2023-09-02T17:41:43.291" v="115" actId="20577"/>
+        <pc:sldMkLst>
+          <pc:docMk/>
+          <pc:sldMk cId="854968803" sldId="337"/>
+        </pc:sldMkLst>
+        <pc:spChg chg="mod">
+          <ac:chgData name="Samer Hasan Al Khatib" userId="68b7a22b-a3eb-4e08-a61f-646d81823754" providerId="ADAL" clId="{9429BEAE-70A6-4AEE-A37D-2075488C87F1}" dt="2023-09-02T17:38:12.305" v="24" actId="1076"/>
+          <ac:spMkLst>
+            <pc:docMk/>
+            <pc:sldMk cId="854968803" sldId="337"/>
+            <ac:spMk id="2" creationId="{E9660416-635C-F38D-4114-E8DE51270D6E}"/>
+          </ac:spMkLst>
+        </pc:spChg>
+        <pc:spChg chg="mod">
+          <ac:chgData name="Samer Hasan Al Khatib" userId="68b7a22b-a3eb-4e08-a61f-646d81823754" providerId="ADAL" clId="{9429BEAE-70A6-4AEE-A37D-2075488C87F1}" dt="2023-09-02T17:41:43.291" v="115" actId="20577"/>
+          <ac:spMkLst>
+            <pc:docMk/>
+            <pc:sldMk cId="854968803" sldId="337"/>
+            <ac:spMk id="3" creationId="{7ACDC8AB-7ED4-F9C9-530B-DD27976653B6}"/>
+          </ac:spMkLst>
+        </pc:spChg>
+      </pc:sldChg>
+      <pc:sldChg chg="addSp delSp modSp new mod">
+        <pc:chgData name="Samer Hasan Al Khatib" userId="68b7a22b-a3eb-4e08-a61f-646d81823754" providerId="ADAL" clId="{9429BEAE-70A6-4AEE-A37D-2075488C87F1}" dt="2023-09-02T17:45:59.708" v="158" actId="6549"/>
+        <pc:sldMkLst>
+          <pc:docMk/>
+          <pc:sldMk cId="3450425002" sldId="338"/>
+        </pc:sldMkLst>
+        <pc:spChg chg="mod">
+          <ac:chgData name="Samer Hasan Al Khatib" userId="68b7a22b-a3eb-4e08-a61f-646d81823754" providerId="ADAL" clId="{9429BEAE-70A6-4AEE-A37D-2075488C87F1}" dt="2023-09-02T17:42:53.594" v="120" actId="27636"/>
+          <ac:spMkLst>
+            <pc:docMk/>
+            <pc:sldMk cId="3450425002" sldId="338"/>
+            <ac:spMk id="2" creationId="{D3ACC331-C6FF-3F50-19A3-98CE3122FA23}"/>
+          </ac:spMkLst>
+        </pc:spChg>
+        <pc:spChg chg="mod">
+          <ac:chgData name="Samer Hasan Al Khatib" userId="68b7a22b-a3eb-4e08-a61f-646d81823754" providerId="ADAL" clId="{9429BEAE-70A6-4AEE-A37D-2075488C87F1}" dt="2023-09-02T17:45:59.708" v="158" actId="6549"/>
+          <ac:spMkLst>
+            <pc:docMk/>
+            <pc:sldMk cId="3450425002" sldId="338"/>
+            <ac:spMk id="3" creationId="{B6314935-B04D-57B2-B8FE-1379F10E937A}"/>
+          </ac:spMkLst>
+        </pc:spChg>
+        <pc:spChg chg="add del">
+          <ac:chgData name="Samer Hasan Al Khatib" userId="68b7a22b-a3eb-4e08-a61f-646d81823754" providerId="ADAL" clId="{9429BEAE-70A6-4AEE-A37D-2075488C87F1}" dt="2023-09-02T17:43:47.135" v="129"/>
+          <ac:spMkLst>
+            <pc:docMk/>
+            <pc:sldMk cId="3450425002" sldId="338"/>
+            <ac:spMk id="4" creationId="{F645C4A1-A47F-48FE-4ABD-86EBC60BF513}"/>
+          </ac:spMkLst>
+        </pc:spChg>
+        <pc:spChg chg="add del mod">
+          <ac:chgData name="Samer Hasan Al Khatib" userId="68b7a22b-a3eb-4e08-a61f-646d81823754" providerId="ADAL" clId="{9429BEAE-70A6-4AEE-A37D-2075488C87F1}" dt="2023-09-02T17:43:46.769" v="128"/>
+          <ac:spMkLst>
+            <pc:docMk/>
+            <pc:sldMk cId="3450425002" sldId="338"/>
+            <ac:spMk id="5" creationId="{EA45F680-C534-A762-49F5-EF4244FCE3FF}"/>
+          </ac:spMkLst>
+        </pc:spChg>
+        <pc:spChg chg="add del mod">
+          <ac:chgData name="Samer Hasan Al Khatib" userId="68b7a22b-a3eb-4e08-a61f-646d81823754" providerId="ADAL" clId="{9429BEAE-70A6-4AEE-A37D-2075488C87F1}" dt="2023-09-02T17:43:46.549" v="127"/>
+          <ac:spMkLst>
+            <pc:docMk/>
+            <pc:sldMk cId="3450425002" sldId="338"/>
+            <ac:spMk id="6" creationId="{F0C63229-A471-38BE-C65C-EEA5B6887989}"/>
+          </ac:spMkLst>
+        </pc:spChg>
+        <pc:spChg chg="add del">
+          <ac:chgData name="Samer Hasan Al Khatib" userId="68b7a22b-a3eb-4e08-a61f-646d81823754" providerId="ADAL" clId="{9429BEAE-70A6-4AEE-A37D-2075488C87F1}" dt="2023-09-02T17:43:49.496" v="131"/>
+          <ac:spMkLst>
+            <pc:docMk/>
+            <pc:sldMk cId="3450425002" sldId="338"/>
+            <ac:spMk id="7" creationId="{E4A7DB54-2F30-9251-F2C9-218D2365A5A8}"/>
+          </ac:spMkLst>
+        </pc:spChg>
+        <pc:spChg chg="add del">
+          <ac:chgData name="Samer Hasan Al Khatib" userId="68b7a22b-a3eb-4e08-a61f-646d81823754" providerId="ADAL" clId="{9429BEAE-70A6-4AEE-A37D-2075488C87F1}" dt="2023-09-02T17:43:53.448" v="133"/>
+          <ac:spMkLst>
+            <pc:docMk/>
+            <pc:sldMk cId="3450425002" sldId="338"/>
+            <ac:spMk id="8" creationId="{0192E085-CB50-23F8-7CE7-A107A9334C7D}"/>
+          </ac:spMkLst>
+        </pc:spChg>
+      </pc:sldChg>
+      <pc:sldChg chg="addSp delSp modSp new mod">
+        <pc:chgData name="Samer Hasan Al Khatib" userId="68b7a22b-a3eb-4e08-a61f-646d81823754" providerId="ADAL" clId="{9429BEAE-70A6-4AEE-A37D-2075488C87F1}" dt="2023-09-02T17:48:04.773" v="199" actId="1076"/>
+        <pc:sldMkLst>
+          <pc:docMk/>
+          <pc:sldMk cId="103963602" sldId="339"/>
+        </pc:sldMkLst>
+        <pc:spChg chg="mod">
+          <ac:chgData name="Samer Hasan Al Khatib" userId="68b7a22b-a3eb-4e08-a61f-646d81823754" providerId="ADAL" clId="{9429BEAE-70A6-4AEE-A37D-2075488C87F1}" dt="2023-09-02T17:46:16.494" v="165" actId="27636"/>
+          <ac:spMkLst>
+            <pc:docMk/>
+            <pc:sldMk cId="103963602" sldId="339"/>
+            <ac:spMk id="2" creationId="{1E82F415-7EE3-27B8-5266-A5354C99E55B}"/>
+          </ac:spMkLst>
+        </pc:spChg>
+        <pc:spChg chg="del mod">
+          <ac:chgData name="Samer Hasan Al Khatib" userId="68b7a22b-a3eb-4e08-a61f-646d81823754" providerId="ADAL" clId="{9429BEAE-70A6-4AEE-A37D-2075488C87F1}" dt="2023-09-02T17:46:33.278" v="167"/>
+          <ac:spMkLst>
+            <pc:docMk/>
+            <pc:sldMk cId="103963602" sldId="339"/>
+            <ac:spMk id="3" creationId="{B6076558-6A4A-B9E0-EE9D-8C840DF560B4}"/>
+          </ac:spMkLst>
+        </pc:spChg>
+        <pc:spChg chg="add mod">
+          <ac:chgData name="Samer Hasan Al Khatib" userId="68b7a22b-a3eb-4e08-a61f-646d81823754" providerId="ADAL" clId="{9429BEAE-70A6-4AEE-A37D-2075488C87F1}" dt="2023-09-02T17:47:51.247" v="196" actId="1076"/>
+          <ac:spMkLst>
+            <pc:docMk/>
+            <pc:sldMk cId="103963602" sldId="339"/>
+            <ac:spMk id="4" creationId="{881C4D7F-3B2F-E13F-DE2C-E35E2623ED21}"/>
+          </ac:spMkLst>
+        </pc:spChg>
+        <pc:spChg chg="add del mod">
+          <ac:chgData name="Samer Hasan Al Khatib" userId="68b7a22b-a3eb-4e08-a61f-646d81823754" providerId="ADAL" clId="{9429BEAE-70A6-4AEE-A37D-2075488C87F1}" dt="2023-09-02T17:48:04.773" v="199" actId="1076"/>
+          <ac:spMkLst>
+            <pc:docMk/>
+            <pc:sldMk cId="103963602" sldId="339"/>
+            <ac:spMk id="5" creationId="{C099611B-49A8-4297-2E48-A426AED13F5A}"/>
+          </ac:spMkLst>
+        </pc:spChg>
+      </pc:sldChg>
+      <pc:sldChg chg="addSp delSp modSp new mod">
+        <pc:chgData name="Samer Hasan Al Khatib" userId="68b7a22b-a3eb-4e08-a61f-646d81823754" providerId="ADAL" clId="{9429BEAE-70A6-4AEE-A37D-2075488C87F1}" dt="2023-09-02T17:50:16.202" v="235" actId="1076"/>
+        <pc:sldMkLst>
+          <pc:docMk/>
+          <pc:sldMk cId="4125225834" sldId="340"/>
+        </pc:sldMkLst>
+        <pc:spChg chg="mod">
+          <ac:chgData name="Samer Hasan Al Khatib" userId="68b7a22b-a3eb-4e08-a61f-646d81823754" providerId="ADAL" clId="{9429BEAE-70A6-4AEE-A37D-2075488C87F1}" dt="2023-09-02T17:48:27.279" v="205" actId="27636"/>
+          <ac:spMkLst>
+            <pc:docMk/>
+            <pc:sldMk cId="4125225834" sldId="340"/>
+            <ac:spMk id="2" creationId="{D5C625E9-1C3B-84DD-AD4B-701EF81C48DA}"/>
+          </ac:spMkLst>
+        </pc:spChg>
+        <pc:spChg chg="mod">
+          <ac:chgData name="Samer Hasan Al Khatib" userId="68b7a22b-a3eb-4e08-a61f-646d81823754" providerId="ADAL" clId="{9429BEAE-70A6-4AEE-A37D-2075488C87F1}" dt="2023-09-02T17:49:04.490" v="211" actId="14100"/>
+          <ac:spMkLst>
+            <pc:docMk/>
+            <pc:sldMk cId="4125225834" sldId="340"/>
+            <ac:spMk id="3" creationId="{392D0B9D-CE99-28E6-1471-8619E39D48A3}"/>
+          </ac:spMkLst>
+        </pc:spChg>
+        <pc:spChg chg="add del mod">
+          <ac:chgData name="Samer Hasan Al Khatib" userId="68b7a22b-a3eb-4e08-a61f-646d81823754" providerId="ADAL" clId="{9429BEAE-70A6-4AEE-A37D-2075488C87F1}" dt="2023-09-02T17:49:36.827" v="224"/>
+          <ac:spMkLst>
+            <pc:docMk/>
+            <pc:sldMk cId="4125225834" sldId="340"/>
+            <ac:spMk id="4" creationId="{A596E743-122E-EA99-3950-273C7984AA4F}"/>
+          </ac:spMkLst>
+        </pc:spChg>
+        <pc:spChg chg="add mod">
+          <ac:chgData name="Samer Hasan Al Khatib" userId="68b7a22b-a3eb-4e08-a61f-646d81823754" providerId="ADAL" clId="{9429BEAE-70A6-4AEE-A37D-2075488C87F1}" dt="2023-09-02T17:50:16.202" v="235" actId="1076"/>
+          <ac:spMkLst>
+            <pc:docMk/>
+            <pc:sldMk cId="4125225834" sldId="340"/>
+            <ac:spMk id="5" creationId="{338324EB-A1D1-06AF-005F-82FD91D91466}"/>
+          </ac:spMkLst>
+        </pc:spChg>
+      </pc:sldChg>
+      <pc:sldChg chg="addSp delSp modSp new mod">
+        <pc:chgData name="Samer Hasan Al Khatib" userId="68b7a22b-a3eb-4e08-a61f-646d81823754" providerId="ADAL" clId="{9429BEAE-70A6-4AEE-A37D-2075488C87F1}" dt="2023-09-02T17:51:04.505" v="248" actId="20577"/>
+        <pc:sldMkLst>
+          <pc:docMk/>
+          <pc:sldMk cId="3309568132" sldId="341"/>
+        </pc:sldMkLst>
+        <pc:spChg chg="mod">
+          <ac:chgData name="Samer Hasan Al Khatib" userId="68b7a22b-a3eb-4e08-a61f-646d81823754" providerId="ADAL" clId="{9429BEAE-70A6-4AEE-A37D-2075488C87F1}" dt="2023-09-02T17:50:38.866" v="240" actId="14100"/>
+          <ac:spMkLst>
+            <pc:docMk/>
+            <pc:sldMk cId="3309568132" sldId="341"/>
+            <ac:spMk id="2" creationId="{94089F39-AD74-21E2-0C33-8EE5AF9DBEB8}"/>
+          </ac:spMkLst>
+        </pc:spChg>
+        <pc:spChg chg="del">
+          <ac:chgData name="Samer Hasan Al Khatib" userId="68b7a22b-a3eb-4e08-a61f-646d81823754" providerId="ADAL" clId="{9429BEAE-70A6-4AEE-A37D-2075488C87F1}" dt="2023-09-02T17:50:50.545" v="241"/>
+          <ac:spMkLst>
+            <pc:docMk/>
+            <pc:sldMk cId="3309568132" sldId="341"/>
+            <ac:spMk id="3" creationId="{C4D1A68E-DCEA-81A3-2ADC-F6F0D3AD36FA}"/>
+          </ac:spMkLst>
+        </pc:spChg>
+        <pc:spChg chg="add mod">
+          <ac:chgData name="Samer Hasan Al Khatib" userId="68b7a22b-a3eb-4e08-a61f-646d81823754" providerId="ADAL" clId="{9429BEAE-70A6-4AEE-A37D-2075488C87F1}" dt="2023-09-02T17:51:04.505" v="248" actId="20577"/>
+          <ac:spMkLst>
+            <pc:docMk/>
+            <pc:sldMk cId="3309568132" sldId="341"/>
+            <ac:spMk id="4" creationId="{F01962C4-C2CE-3F3C-5A92-78234984A99F}"/>
+          </ac:spMkLst>
+        </pc:spChg>
+      </pc:sldChg>
+      <pc:sldChg chg="addSp delSp modSp new mod">
+        <pc:chgData name="Samer Hasan Al Khatib" userId="68b7a22b-a3eb-4e08-a61f-646d81823754" providerId="ADAL" clId="{9429BEAE-70A6-4AEE-A37D-2075488C87F1}" dt="2023-09-02T17:51:34.882" v="256" actId="20577"/>
+        <pc:sldMkLst>
+          <pc:docMk/>
+          <pc:sldMk cId="2377643007" sldId="342"/>
+        </pc:sldMkLst>
+        <pc:spChg chg="mod">
+          <ac:chgData name="Samer Hasan Al Khatib" userId="68b7a22b-a3eb-4e08-a61f-646d81823754" providerId="ADAL" clId="{9429BEAE-70A6-4AEE-A37D-2075488C87F1}" dt="2023-09-02T17:51:21.079" v="253" actId="14100"/>
+          <ac:spMkLst>
+            <pc:docMk/>
+            <pc:sldMk cId="2377643007" sldId="342"/>
+            <ac:spMk id="2" creationId="{08E799A4-B4FE-E9E5-4327-D8CEB19864A2}"/>
+          </ac:spMkLst>
+        </pc:spChg>
+        <pc:spChg chg="del">
+          <ac:chgData name="Samer Hasan Al Khatib" userId="68b7a22b-a3eb-4e08-a61f-646d81823754" providerId="ADAL" clId="{9429BEAE-70A6-4AEE-A37D-2075488C87F1}" dt="2023-09-02T17:51:28.597" v="254"/>
+          <ac:spMkLst>
+            <pc:docMk/>
+            <pc:sldMk cId="2377643007" sldId="342"/>
+            <ac:spMk id="3" creationId="{49AEC45F-91DD-BB86-ABC6-B631EE955878}"/>
+          </ac:spMkLst>
+        </pc:spChg>
+        <pc:spChg chg="add mod">
+          <ac:chgData name="Samer Hasan Al Khatib" userId="68b7a22b-a3eb-4e08-a61f-646d81823754" providerId="ADAL" clId="{9429BEAE-70A6-4AEE-A37D-2075488C87F1}" dt="2023-09-02T17:51:34.882" v="256" actId="20577"/>
+          <ac:spMkLst>
+            <pc:docMk/>
+            <pc:sldMk cId="2377643007" sldId="342"/>
+            <ac:spMk id="4" creationId="{1F9AEB82-0465-AE90-5207-7DB1222B9627}"/>
+          </ac:spMkLst>
+        </pc:spChg>
+      </pc:sldChg>
+      <pc:sldChg chg="addSp delSp modSp new mod">
+        <pc:chgData name="Samer Hasan Al Khatib" userId="68b7a22b-a3eb-4e08-a61f-646d81823754" providerId="ADAL" clId="{9429BEAE-70A6-4AEE-A37D-2075488C87F1}" dt="2023-09-02T17:52:04.424" v="263" actId="20577"/>
+        <pc:sldMkLst>
+          <pc:docMk/>
+          <pc:sldMk cId="3845583410" sldId="343"/>
+        </pc:sldMkLst>
+        <pc:spChg chg="mod">
+          <ac:chgData name="Samer Hasan Al Khatib" userId="68b7a22b-a3eb-4e08-a61f-646d81823754" providerId="ADAL" clId="{9429BEAE-70A6-4AEE-A37D-2075488C87F1}" dt="2023-09-02T17:51:53.174" v="261" actId="14100"/>
+          <ac:spMkLst>
+            <pc:docMk/>
+            <pc:sldMk cId="3845583410" sldId="343"/>
+            <ac:spMk id="2" creationId="{C0758739-3100-6D29-5173-2C2DC932A22D}"/>
+          </ac:spMkLst>
+        </pc:spChg>
+        <pc:spChg chg="del">
+          <ac:chgData name="Samer Hasan Al Khatib" userId="68b7a22b-a3eb-4e08-a61f-646d81823754" providerId="ADAL" clId="{9429BEAE-70A6-4AEE-A37D-2075488C87F1}" dt="2023-09-02T17:52:01.764" v="262"/>
+          <ac:spMkLst>
+            <pc:docMk/>
+            <pc:sldMk cId="3845583410" sldId="343"/>
+            <ac:spMk id="3" creationId="{946A58D2-6AE0-1DAB-85DA-632EDFF2B373}"/>
+          </ac:spMkLst>
+        </pc:spChg>
+        <pc:spChg chg="add mod">
+          <ac:chgData name="Samer Hasan Al Khatib" userId="68b7a22b-a3eb-4e08-a61f-646d81823754" providerId="ADAL" clId="{9429BEAE-70A6-4AEE-A37D-2075488C87F1}" dt="2023-09-02T17:52:04.424" v="263" actId="20577"/>
+          <ac:spMkLst>
+            <pc:docMk/>
+            <pc:sldMk cId="3845583410" sldId="343"/>
+            <ac:spMk id="4" creationId="{CDF42390-C4C2-63E3-000E-62C8D0C7B6DC}"/>
+          </ac:spMkLst>
+        </pc:spChg>
+      </pc:sldChg>
+      <pc:sldChg chg="addSp delSp modSp new mod setBg">
+        <pc:chgData name="Samer Hasan Al Khatib" userId="68b7a22b-a3eb-4e08-a61f-646d81823754" providerId="ADAL" clId="{9429BEAE-70A6-4AEE-A37D-2075488C87F1}" dt="2023-09-03T14:34:21.843" v="432" actId="26606"/>
+        <pc:sldMkLst>
+          <pc:docMk/>
+          <pc:sldMk cId="1839542533" sldId="344"/>
+        </pc:sldMkLst>
+        <pc:spChg chg="mod">
+          <ac:chgData name="Samer Hasan Al Khatib" userId="68b7a22b-a3eb-4e08-a61f-646d81823754" providerId="ADAL" clId="{9429BEAE-70A6-4AEE-A37D-2075488C87F1}" dt="2023-09-03T14:34:21.843" v="432" actId="26606"/>
+          <ac:spMkLst>
+            <pc:docMk/>
+            <pc:sldMk cId="1839542533" sldId="344"/>
+            <ac:spMk id="2" creationId="{D43A4F26-5F5B-AFFD-5D20-61193A0BA276}"/>
+          </ac:spMkLst>
+        </pc:spChg>
+        <pc:spChg chg="add del mod">
+          <ac:chgData name="Samer Hasan Al Khatib" userId="68b7a22b-a3eb-4e08-a61f-646d81823754" providerId="ADAL" clId="{9429BEAE-70A6-4AEE-A37D-2075488C87F1}" dt="2023-09-03T14:34:21.843" v="432" actId="26606"/>
+          <ac:spMkLst>
+            <pc:docMk/>
+            <pc:sldMk cId="1839542533" sldId="344"/>
+            <ac:spMk id="3" creationId="{FC76A734-F9DC-76C5-85A1-49E007129E90}"/>
+          </ac:spMkLst>
+        </pc:spChg>
+        <pc:spChg chg="add">
+          <ac:chgData name="Samer Hasan Al Khatib" userId="68b7a22b-a3eb-4e08-a61f-646d81823754" providerId="ADAL" clId="{9429BEAE-70A6-4AEE-A37D-2075488C87F1}" dt="2023-09-03T14:34:21.843" v="432" actId="26606"/>
+          <ac:spMkLst>
+            <pc:docMk/>
+            <pc:sldMk cId="1839542533" sldId="344"/>
+            <ac:spMk id="8" creationId="{FC76A734-F9DC-76C5-85A1-49E007129E90}"/>
+          </ac:spMkLst>
+        </pc:spChg>
+        <pc:graphicFrameChg chg="add del">
+          <ac:chgData name="Samer Hasan Al Khatib" userId="68b7a22b-a3eb-4e08-a61f-646d81823754" providerId="ADAL" clId="{9429BEAE-70A6-4AEE-A37D-2075488C87F1}" dt="2023-09-03T14:34:21.767" v="431" actId="26606"/>
+          <ac:graphicFrameMkLst>
+            <pc:docMk/>
+            <pc:sldMk cId="1839542533" sldId="344"/>
+            <ac:graphicFrameMk id="5" creationId="{9CBDAF1C-B040-C5BD-4216-BD73183F1EB4}"/>
+          </ac:graphicFrameMkLst>
+        </pc:graphicFrameChg>
+        <pc:picChg chg="add">
+          <ac:chgData name="Samer Hasan Al Khatib" userId="68b7a22b-a3eb-4e08-a61f-646d81823754" providerId="ADAL" clId="{9429BEAE-70A6-4AEE-A37D-2075488C87F1}" dt="2023-09-03T14:34:21.843" v="432" actId="26606"/>
+          <ac:picMkLst>
+            <pc:docMk/>
+            <pc:sldMk cId="1839542533" sldId="344"/>
+            <ac:picMk id="7" creationId="{7FB392F8-67BC-B7CF-75FA-599FF7024A53}"/>
+          </ac:picMkLst>
+        </pc:picChg>
+      </pc:sldChg>
+      <pc:sldChg chg="addSp delSp modSp new mod">
+        <pc:chgData name="Samer Hasan Al Khatib" userId="68b7a22b-a3eb-4e08-a61f-646d81823754" providerId="ADAL" clId="{9429BEAE-70A6-4AEE-A37D-2075488C87F1}" dt="2023-09-02T17:58:51.543" v="290" actId="1076"/>
+        <pc:sldMkLst>
+          <pc:docMk/>
+          <pc:sldMk cId="3698680020" sldId="345"/>
+        </pc:sldMkLst>
+        <pc:spChg chg="del">
+          <ac:chgData name="Samer Hasan Al Khatib" userId="68b7a22b-a3eb-4e08-a61f-646d81823754" providerId="ADAL" clId="{9429BEAE-70A6-4AEE-A37D-2075488C87F1}" dt="2023-09-02T17:58:47.163" v="288" actId="478"/>
+          <ac:spMkLst>
+            <pc:docMk/>
+            <pc:sldMk cId="3698680020" sldId="345"/>
+            <ac:spMk id="2" creationId="{630D9DCD-45AC-5CAB-252D-4FA4ED730F41}"/>
+          </ac:spMkLst>
+        </pc:spChg>
+        <pc:spChg chg="del">
+          <ac:chgData name="Samer Hasan Al Khatib" userId="68b7a22b-a3eb-4e08-a61f-646d81823754" providerId="ADAL" clId="{9429BEAE-70A6-4AEE-A37D-2075488C87F1}" dt="2023-09-02T17:58:48.355" v="289" actId="478"/>
+          <ac:spMkLst>
+            <pc:docMk/>
+            <pc:sldMk cId="3698680020" sldId="345"/>
+            <ac:spMk id="3" creationId="{7BD4F107-6AC8-75D6-F23D-838576FA0CC3}"/>
+          </ac:spMkLst>
+        </pc:spChg>
+        <pc:picChg chg="add mod">
+          <ac:chgData name="Samer Hasan Al Khatib" userId="68b7a22b-a3eb-4e08-a61f-646d81823754" providerId="ADAL" clId="{9429BEAE-70A6-4AEE-A37D-2075488C87F1}" dt="2023-09-02T17:58:51.543" v="290" actId="1076"/>
+          <ac:picMkLst>
+            <pc:docMk/>
+            <pc:sldMk cId="3698680020" sldId="345"/>
+            <ac:picMk id="7170" creationId="{89CC6480-0824-DF51-6C4A-58259B50335D}"/>
+          </ac:picMkLst>
+        </pc:picChg>
+      </pc:sldChg>
+      <pc:sldChg chg="modSp new mod">
+        <pc:chgData name="Samer Hasan Al Khatib" userId="68b7a22b-a3eb-4e08-a61f-646d81823754" providerId="ADAL" clId="{9429BEAE-70A6-4AEE-A37D-2075488C87F1}" dt="2023-09-02T18:02:25.623" v="301" actId="27636"/>
+        <pc:sldMkLst>
+          <pc:docMk/>
+          <pc:sldMk cId="3263991133" sldId="346"/>
+        </pc:sldMkLst>
+        <pc:spChg chg="mod">
+          <ac:chgData name="Samer Hasan Al Khatib" userId="68b7a22b-a3eb-4e08-a61f-646d81823754" providerId="ADAL" clId="{9429BEAE-70A6-4AEE-A37D-2075488C87F1}" dt="2023-09-02T18:01:59.384" v="296" actId="27636"/>
+          <ac:spMkLst>
+            <pc:docMk/>
+            <pc:sldMk cId="3263991133" sldId="346"/>
+            <ac:spMk id="2" creationId="{144256B3-F229-71D9-6A29-A672393957A0}"/>
+          </ac:spMkLst>
+        </pc:spChg>
+        <pc:spChg chg="mod">
+          <ac:chgData name="Samer Hasan Al Khatib" userId="68b7a22b-a3eb-4e08-a61f-646d81823754" providerId="ADAL" clId="{9429BEAE-70A6-4AEE-A37D-2075488C87F1}" dt="2023-09-02T18:02:25.623" v="301" actId="27636"/>
+          <ac:spMkLst>
+            <pc:docMk/>
+            <pc:sldMk cId="3263991133" sldId="346"/>
+            <ac:spMk id="3" creationId="{67F8C439-C7FD-E60E-AED3-2E44404CB2D0}"/>
+          </ac:spMkLst>
+        </pc:spChg>
+      </pc:sldChg>
+      <pc:sldChg chg="modSp new mod">
+        <pc:chgData name="Samer Hasan Al Khatib" userId="68b7a22b-a3eb-4e08-a61f-646d81823754" providerId="ADAL" clId="{9429BEAE-70A6-4AEE-A37D-2075488C87F1}" dt="2023-09-03T13:00:25.816" v="365" actId="6549"/>
+        <pc:sldMkLst>
+          <pc:docMk/>
+          <pc:sldMk cId="4246500147" sldId="348"/>
+        </pc:sldMkLst>
+        <pc:spChg chg="mod">
+          <ac:chgData name="Samer Hasan Al Khatib" userId="68b7a22b-a3eb-4e08-a61f-646d81823754" providerId="ADAL" clId="{9429BEAE-70A6-4AEE-A37D-2075488C87F1}" dt="2023-09-03T12:57:52.610" v="349" actId="20577"/>
+          <ac:spMkLst>
+            <pc:docMk/>
+            <pc:sldMk cId="4246500147" sldId="348"/>
+            <ac:spMk id="2" creationId="{8DBAE410-6367-79F2-EAB1-7BAA3F881A69}"/>
+          </ac:spMkLst>
+        </pc:spChg>
+        <pc:spChg chg="mod">
+          <ac:chgData name="Samer Hasan Al Khatib" userId="68b7a22b-a3eb-4e08-a61f-646d81823754" providerId="ADAL" clId="{9429BEAE-70A6-4AEE-A37D-2075488C87F1}" dt="2023-09-03T13:00:25.816" v="365" actId="6549"/>
+          <ac:spMkLst>
+            <pc:docMk/>
+            <pc:sldMk cId="4246500147" sldId="348"/>
+            <ac:spMk id="3" creationId="{F1BCFDBE-1422-64E9-0E2C-82E41B719649}"/>
+          </ac:spMkLst>
+        </pc:spChg>
+      </pc:sldChg>
+      <pc:sldChg chg="modSp new mod">
+        <pc:chgData name="Samer Hasan Al Khatib" userId="68b7a22b-a3eb-4e08-a61f-646d81823754" providerId="ADAL" clId="{9429BEAE-70A6-4AEE-A37D-2075488C87F1}" dt="2023-09-03T13:01:45.816" v="384" actId="313"/>
+        <pc:sldMkLst>
+          <pc:docMk/>
+          <pc:sldMk cId="4105843879" sldId="349"/>
+        </pc:sldMkLst>
+        <pc:spChg chg="mod">
+          <ac:chgData name="Samer Hasan Al Khatib" userId="68b7a22b-a3eb-4e08-a61f-646d81823754" providerId="ADAL" clId="{9429BEAE-70A6-4AEE-A37D-2075488C87F1}" dt="2023-09-03T13:01:45.816" v="384" actId="313"/>
+          <ac:spMkLst>
+            <pc:docMk/>
+            <pc:sldMk cId="4105843879" sldId="349"/>
+            <ac:spMk id="2" creationId="{6B6ED9A3-6126-CA94-1220-61D69430995C}"/>
+          </ac:spMkLst>
+        </pc:spChg>
+        <pc:spChg chg="mod">
+          <ac:chgData name="Samer Hasan Al Khatib" userId="68b7a22b-a3eb-4e08-a61f-646d81823754" providerId="ADAL" clId="{9429BEAE-70A6-4AEE-A37D-2075488C87F1}" dt="2023-09-03T13:01:38.872" v="383"/>
+          <ac:spMkLst>
+            <pc:docMk/>
+            <pc:sldMk cId="4105843879" sldId="349"/>
+            <ac:spMk id="3" creationId="{84E280F6-E812-A2EE-2F66-B275370468BB}"/>
+          </ac:spMkLst>
+        </pc:spChg>
+      </pc:sldChg>
+      <pc:sldChg chg="delSp modSp new mod">
+        <pc:chgData name="Samer Hasan Al Khatib" userId="68b7a22b-a3eb-4e08-a61f-646d81823754" providerId="ADAL" clId="{9429BEAE-70A6-4AEE-A37D-2075488C87F1}" dt="2023-09-03T13:02:15.230" v="389" actId="12"/>
+        <pc:sldMkLst>
+          <pc:docMk/>
+          <pc:sldMk cId="1980642118" sldId="350"/>
+        </pc:sldMkLst>
+        <pc:spChg chg="del">
+          <ac:chgData name="Samer Hasan Al Khatib" userId="68b7a22b-a3eb-4e08-a61f-646d81823754" providerId="ADAL" clId="{9429BEAE-70A6-4AEE-A37D-2075488C87F1}" dt="2023-09-03T13:02:07.769" v="386" actId="478"/>
+          <ac:spMkLst>
+            <pc:docMk/>
+            <pc:sldMk cId="1980642118" sldId="350"/>
+            <ac:spMk id="2" creationId="{8B6FE329-2BB6-0611-861B-7586FC9CAABC}"/>
+          </ac:spMkLst>
+        </pc:spChg>
+        <pc:spChg chg="mod">
+          <ac:chgData name="Samer Hasan Al Khatib" userId="68b7a22b-a3eb-4e08-a61f-646d81823754" providerId="ADAL" clId="{9429BEAE-70A6-4AEE-A37D-2075488C87F1}" dt="2023-09-03T13:02:15.230" v="389" actId="12"/>
+          <ac:spMkLst>
+            <pc:docMk/>
+            <pc:sldMk cId="1980642118" sldId="350"/>
+            <ac:spMk id="3" creationId="{C1522645-8F1B-3C73-7B01-C3848CB2CBBE}"/>
+          </ac:spMkLst>
+        </pc:spChg>
+      </pc:sldChg>
+      <pc:sldChg chg="modSp new mod">
+        <pc:chgData name="Samer Hasan Al Khatib" userId="68b7a22b-a3eb-4e08-a61f-646d81823754" providerId="ADAL" clId="{9429BEAE-70A6-4AEE-A37D-2075488C87F1}" dt="2023-09-03T13:10:07.529" v="421" actId="12"/>
+        <pc:sldMkLst>
+          <pc:docMk/>
+          <pc:sldMk cId="1354391041" sldId="351"/>
+        </pc:sldMkLst>
+        <pc:spChg chg="mod">
+          <ac:chgData name="Samer Hasan Al Khatib" userId="68b7a22b-a3eb-4e08-a61f-646d81823754" providerId="ADAL" clId="{9429BEAE-70A6-4AEE-A37D-2075488C87F1}" dt="2023-09-03T13:10:00.430" v="418" actId="20577"/>
+          <ac:spMkLst>
+            <pc:docMk/>
+            <pc:sldMk cId="1354391041" sldId="351"/>
+            <ac:spMk id="2" creationId="{54D91B2A-FBC6-B27E-B119-3AD62A04EC17}"/>
+          </ac:spMkLst>
+        </pc:spChg>
+        <pc:spChg chg="mod">
+          <ac:chgData name="Samer Hasan Al Khatib" userId="68b7a22b-a3eb-4e08-a61f-646d81823754" providerId="ADAL" clId="{9429BEAE-70A6-4AEE-A37D-2075488C87F1}" dt="2023-09-03T13:10:07.529" v="421" actId="12"/>
+          <ac:spMkLst>
+            <pc:docMk/>
+            <pc:sldMk cId="1354391041" sldId="351"/>
+            <ac:spMk id="3" creationId="{E576E56F-510B-4E90-0C1A-D4C081ED7B3E}"/>
+          </ac:spMkLst>
+        </pc:spChg>
+      </pc:sldChg>
+      <pc:sldChg chg="addSp delSp modSp new mod">
+        <pc:chgData name="Samer Hasan Al Khatib" userId="68b7a22b-a3eb-4e08-a61f-646d81823754" providerId="ADAL" clId="{9429BEAE-70A6-4AEE-A37D-2075488C87F1}" dt="2023-09-03T13:12:08.849" v="429" actId="14100"/>
+        <pc:sldMkLst>
+          <pc:docMk/>
+          <pc:sldMk cId="423621241" sldId="352"/>
+        </pc:sldMkLst>
+        <pc:spChg chg="mod">
+          <ac:chgData name="Samer Hasan Al Khatib" userId="68b7a22b-a3eb-4e08-a61f-646d81823754" providerId="ADAL" clId="{9429BEAE-70A6-4AEE-A37D-2075488C87F1}" dt="2023-09-03T13:12:03.967" v="427" actId="27636"/>
+          <ac:spMkLst>
+            <pc:docMk/>
+            <pc:sldMk cId="423621241" sldId="352"/>
+            <ac:spMk id="2" creationId="{6BB4C01F-0651-CA65-45BD-E699106A3746}"/>
+          </ac:spMkLst>
+        </pc:spChg>
+        <pc:spChg chg="del">
+          <ac:chgData name="Samer Hasan Al Khatib" userId="68b7a22b-a3eb-4e08-a61f-646d81823754" providerId="ADAL" clId="{9429BEAE-70A6-4AEE-A37D-2075488C87F1}" dt="2023-09-03T13:11:53.670" v="424" actId="931"/>
+          <ac:spMkLst>
+            <pc:docMk/>
+            <pc:sldMk cId="423621241" sldId="352"/>
+            <ac:spMk id="3" creationId="{5B3CF384-CF8B-7D4B-E36C-2FB2FBE5D8F9}"/>
+          </ac:spMkLst>
+        </pc:spChg>
+        <pc:picChg chg="add mod">
+          <ac:chgData name="Samer Hasan Al Khatib" userId="68b7a22b-a3eb-4e08-a61f-646d81823754" providerId="ADAL" clId="{9429BEAE-70A6-4AEE-A37D-2075488C87F1}" dt="2023-09-03T13:12:08.849" v="429" actId="14100"/>
+          <ac:picMkLst>
+            <pc:docMk/>
+            <pc:sldMk cId="423621241" sldId="352"/>
+            <ac:picMk id="5" creationId="{2C452D49-8568-C355-FDC7-D6946D39B8D7}"/>
+          </ac:picMkLst>
+        </pc:picChg>
+      </pc:sldChg>
+      <pc:sldChg chg="modSp new mod">
+        <pc:chgData name="Samer Hasan Al Khatib" userId="68b7a22b-a3eb-4e08-a61f-646d81823754" providerId="ADAL" clId="{9429BEAE-70A6-4AEE-A37D-2075488C87F1}" dt="2023-09-04T13:09:58.246" v="858"/>
+        <pc:sldMkLst>
+          <pc:docMk/>
+          <pc:sldMk cId="3020274771" sldId="353"/>
+        </pc:sldMkLst>
+        <pc:spChg chg="mod">
+          <ac:chgData name="Samer Hasan Al Khatib" userId="68b7a22b-a3eb-4e08-a61f-646d81823754" providerId="ADAL" clId="{9429BEAE-70A6-4AEE-A37D-2075488C87F1}" dt="2023-09-04T12:51:32.361" v="479" actId="27636"/>
+          <ac:spMkLst>
+            <pc:docMk/>
+            <pc:sldMk cId="3020274771" sldId="353"/>
+            <ac:spMk id="2" creationId="{28AE98CE-5B1D-A537-5999-327A911553BA}"/>
+          </ac:spMkLst>
+        </pc:spChg>
+        <pc:spChg chg="mod">
+          <ac:chgData name="Samer Hasan Al Khatib" userId="68b7a22b-a3eb-4e08-a61f-646d81823754" providerId="ADAL" clId="{9429BEAE-70A6-4AEE-A37D-2075488C87F1}" dt="2023-09-04T13:09:58.246" v="858"/>
+          <ac:spMkLst>
+            <pc:docMk/>
+            <pc:sldMk cId="3020274771" sldId="353"/>
+            <ac:spMk id="3" creationId="{1AA7FC27-A99E-479F-26C8-C5C791C22577}"/>
+          </ac:spMkLst>
+        </pc:spChg>
+      </pc:sldChg>
+      <pc:sldChg chg="addSp delSp modSp new mod">
+        <pc:chgData name="Samer Hasan Al Khatib" userId="68b7a22b-a3eb-4e08-a61f-646d81823754" providerId="ADAL" clId="{9429BEAE-70A6-4AEE-A37D-2075488C87F1}" dt="2023-09-04T13:13:56.337" v="865" actId="207"/>
+        <pc:sldMkLst>
+          <pc:docMk/>
+          <pc:sldMk cId="2596499514" sldId="354"/>
+        </pc:sldMkLst>
+        <pc:spChg chg="del">
+          <ac:chgData name="Samer Hasan Al Khatib" userId="68b7a22b-a3eb-4e08-a61f-646d81823754" providerId="ADAL" clId="{9429BEAE-70A6-4AEE-A37D-2075488C87F1}" dt="2023-09-04T12:55:36.418" v="600" actId="478"/>
+          <ac:spMkLst>
+            <pc:docMk/>
+            <pc:sldMk cId="2596499514" sldId="354"/>
+            <ac:spMk id="2" creationId="{B3C19A7A-40C9-66C3-13AE-D42207B8B5C6}"/>
+          </ac:spMkLst>
+        </pc:spChg>
+        <pc:spChg chg="mod">
+          <ac:chgData name="Samer Hasan Al Khatib" userId="68b7a22b-a3eb-4e08-a61f-646d81823754" providerId="ADAL" clId="{9429BEAE-70A6-4AEE-A37D-2075488C87F1}" dt="2023-09-04T13:13:56.337" v="865" actId="207"/>
+          <ac:spMkLst>
+            <pc:docMk/>
+            <pc:sldMk cId="2596499514" sldId="354"/>
+            <ac:spMk id="3" creationId="{C6223808-11F8-D5BC-FCB6-035D60D609BE}"/>
+          </ac:spMkLst>
+        </pc:spChg>
+        <pc:spChg chg="add del">
+          <ac:chgData name="Samer Hasan Al Khatib" userId="68b7a22b-a3eb-4e08-a61f-646d81823754" providerId="ADAL" clId="{9429BEAE-70A6-4AEE-A37D-2075488C87F1}" dt="2023-09-04T12:56:07.662" v="611"/>
+          <ac:spMkLst>
+            <pc:docMk/>
+            <pc:sldMk cId="2596499514" sldId="354"/>
+            <ac:spMk id="4" creationId="{1683949A-D2A0-29FF-7556-4318304AEA9F}"/>
+          </ac:spMkLst>
+        </pc:spChg>
+        <pc:spChg chg="add del">
+          <ac:chgData name="Samer Hasan Al Khatib" userId="68b7a22b-a3eb-4e08-a61f-646d81823754" providerId="ADAL" clId="{9429BEAE-70A6-4AEE-A37D-2075488C87F1}" dt="2023-09-04T12:56:11.987" v="613"/>
+          <ac:spMkLst>
+            <pc:docMk/>
+            <pc:sldMk cId="2596499514" sldId="354"/>
+            <ac:spMk id="5" creationId="{76C4FE70-7816-E824-A98E-FC3D75EF1C48}"/>
+          </ac:spMkLst>
+        </pc:spChg>
+        <pc:spChg chg="add del mod">
+          <ac:chgData name="Samer Hasan Al Khatib" userId="68b7a22b-a3eb-4e08-a61f-646d81823754" providerId="ADAL" clId="{9429BEAE-70A6-4AEE-A37D-2075488C87F1}" dt="2023-09-04T12:56:27.818" v="620"/>
+          <ac:spMkLst>
+            <pc:docMk/>
+            <pc:sldMk cId="2596499514" sldId="354"/>
+            <ac:spMk id="6" creationId="{650BEAE8-E616-A578-9474-190AEA44CCA4}"/>
+          </ac:spMkLst>
+        </pc:spChg>
+        <pc:spChg chg="add del">
+          <ac:chgData name="Samer Hasan Al Khatib" userId="68b7a22b-a3eb-4e08-a61f-646d81823754" providerId="ADAL" clId="{9429BEAE-70A6-4AEE-A37D-2075488C87F1}" dt="2023-09-04T12:56:26.841" v="618"/>
+          <ac:spMkLst>
+            <pc:docMk/>
+            <pc:sldMk cId="2596499514" sldId="354"/>
+            <ac:spMk id="7" creationId="{13288BB5-17A8-FE96-7D3C-E2E5531B2C66}"/>
+          </ac:spMkLst>
+        </pc:spChg>
+      </pc:sldChg>
+      <pc:sldChg chg="modSp new mod">
+        <pc:chgData name="Samer Hasan Al Khatib" userId="68b7a22b-a3eb-4e08-a61f-646d81823754" providerId="ADAL" clId="{9429BEAE-70A6-4AEE-A37D-2075488C87F1}" dt="2023-09-05T12:57:38.121" v="996" actId="20577"/>
+        <pc:sldMkLst>
+          <pc:docMk/>
+          <pc:sldMk cId="3706671491" sldId="360"/>
+        </pc:sldMkLst>
+        <pc:spChg chg="mod">
+          <ac:chgData name="Samer Hasan Al Khatib" userId="68b7a22b-a3eb-4e08-a61f-646d81823754" providerId="ADAL" clId="{9429BEAE-70A6-4AEE-A37D-2075488C87F1}" dt="2023-09-05T12:47:00.242" v="869" actId="27636"/>
+          <ac:spMkLst>
+            <pc:docMk/>
+            <pc:sldMk cId="3706671491" sldId="360"/>
+            <ac:spMk id="2" creationId="{5CAB13CF-4481-B408-82E5-DDCC15217E52}"/>
+          </ac:spMkLst>
+        </pc:spChg>
+        <pc:spChg chg="mod">
+          <ac:chgData name="Samer Hasan Al Khatib" userId="68b7a22b-a3eb-4e08-a61f-646d81823754" providerId="ADAL" clId="{9429BEAE-70A6-4AEE-A37D-2075488C87F1}" dt="2023-09-05T12:57:38.121" v="996" actId="20577"/>
+          <ac:spMkLst>
+            <pc:docMk/>
+            <pc:sldMk cId="3706671491" sldId="360"/>
+            <ac:spMk id="3" creationId="{79D00269-B8FF-5997-D333-3901DA0CF476}"/>
+          </ac:spMkLst>
+        </pc:spChg>
+      </pc:sldChg>
+      <pc:sldChg chg="new del">
+        <pc:chgData name="Samer Hasan Al Khatib" userId="68b7a22b-a3eb-4e08-a61f-646d81823754" providerId="ADAL" clId="{9429BEAE-70A6-4AEE-A37D-2075488C87F1}" dt="2023-09-05T12:57:44.341" v="997" actId="2696"/>
+        <pc:sldMkLst>
+          <pc:docMk/>
+          <pc:sldMk cId="537569939" sldId="361"/>
+        </pc:sldMkLst>
+      </pc:sldChg>
+      <pc:sldChg chg="modSp new mod ord">
+        <pc:chgData name="Samer Hasan Al Khatib" userId="68b7a22b-a3eb-4e08-a61f-646d81823754" providerId="ADAL" clId="{9429BEAE-70A6-4AEE-A37D-2075488C87F1}" dt="2023-09-05T14:57:12.034" v="1127" actId="14100"/>
+        <pc:sldMkLst>
+          <pc:docMk/>
+          <pc:sldMk cId="2289709080" sldId="361"/>
+        </pc:sldMkLst>
+        <pc:spChg chg="mod">
+          <ac:chgData name="Samer Hasan Al Khatib" userId="68b7a22b-a3eb-4e08-a61f-646d81823754" providerId="ADAL" clId="{9429BEAE-70A6-4AEE-A37D-2075488C87F1}" dt="2023-09-05T14:54:52.814" v="1005" actId="20577"/>
+          <ac:spMkLst>
+            <pc:docMk/>
+            <pc:sldMk cId="2289709080" sldId="361"/>
+            <ac:spMk id="2" creationId="{A7E357CB-0FC9-38FE-FE05-A8C30658A8BF}"/>
+          </ac:spMkLst>
+        </pc:spChg>
+        <pc:spChg chg="mod">
+          <ac:chgData name="Samer Hasan Al Khatib" userId="68b7a22b-a3eb-4e08-a61f-646d81823754" providerId="ADAL" clId="{9429BEAE-70A6-4AEE-A37D-2075488C87F1}" dt="2023-09-05T14:57:12.034" v="1127" actId="14100"/>
+          <ac:spMkLst>
+            <pc:docMk/>
+            <pc:sldMk cId="2289709080" sldId="361"/>
+            <ac:spMk id="3" creationId="{8817443C-E7A2-BD59-4D90-FA737EC78E3F}"/>
+          </ac:spMkLst>
+        </pc:spChg>
+      </pc:sldChg>
+    </pc:docChg>
+  </pc:docChgLst>
+  <pc:docChgLst>
+    <pc:chgData name="Samer Hasan Al Khatib" userId="68b7a22b-a3eb-4e08-a61f-646d81823754" providerId="ADAL" clId="{AAED9A61-9B94-455C-9872-D686D363AB3A}"/>
+    <pc:docChg chg="custSel addSld modSld sldOrd">
+      <pc:chgData name="Samer Hasan Al Khatib" userId="68b7a22b-a3eb-4e08-a61f-646d81823754" providerId="ADAL" clId="{AAED9A61-9B94-455C-9872-D686D363AB3A}" dt="2023-08-23T13:55:50.614" v="102" actId="20577"/>
+      <pc:docMkLst>
+        <pc:docMk/>
+      </pc:docMkLst>
+      <pc:sldChg chg="modSp mod">
+        <pc:chgData name="Samer Hasan Al Khatib" userId="68b7a22b-a3eb-4e08-a61f-646d81823754" providerId="ADAL" clId="{AAED9A61-9B94-455C-9872-D686D363AB3A}" dt="2023-08-23T09:43:20.976" v="52" actId="20577"/>
+        <pc:sldMkLst>
+          <pc:docMk/>
+          <pc:sldMk cId="439875432" sldId="285"/>
+        </pc:sldMkLst>
+        <pc:spChg chg="mod">
+          <ac:chgData name="Samer Hasan Al Khatib" userId="68b7a22b-a3eb-4e08-a61f-646d81823754" providerId="ADAL" clId="{AAED9A61-9B94-455C-9872-D686D363AB3A}" dt="2023-08-23T09:43:20.976" v="52" actId="20577"/>
+          <ac:spMkLst>
+            <pc:docMk/>
+            <pc:sldMk cId="439875432" sldId="285"/>
+            <ac:spMk id="3" creationId="{E91B2835-7C5A-DA92-3031-9A45FABEA04E}"/>
+          </ac:spMkLst>
+        </pc:spChg>
+      </pc:sldChg>
+      <pc:sldChg chg="addSp delSp modSp new mod ord">
+        <pc:chgData name="Samer Hasan Al Khatib" userId="68b7a22b-a3eb-4e08-a61f-646d81823754" providerId="ADAL" clId="{AAED9A61-9B94-455C-9872-D686D363AB3A}" dt="2023-08-23T13:51:08.472" v="59" actId="14100"/>
+        <pc:sldMkLst>
+          <pc:docMk/>
+          <pc:sldMk cId="4143296048" sldId="295"/>
+        </pc:sldMkLst>
+        <pc:spChg chg="del">
+          <ac:chgData name="Samer Hasan Al Khatib" userId="68b7a22b-a3eb-4e08-a61f-646d81823754" providerId="ADAL" clId="{AAED9A61-9B94-455C-9872-D686D363AB3A}" dt="2023-08-23T13:51:01.460" v="56" actId="478"/>
+          <ac:spMkLst>
+            <pc:docMk/>
+            <pc:sldMk cId="4143296048" sldId="295"/>
+            <ac:spMk id="2" creationId="{16C03D72-3154-BB81-10D4-1BCDD6D15532}"/>
+          </ac:spMkLst>
+        </pc:spChg>
+        <pc:spChg chg="del">
+          <ac:chgData name="Samer Hasan Al Khatib" userId="68b7a22b-a3eb-4e08-a61f-646d81823754" providerId="ADAL" clId="{AAED9A61-9B94-455C-9872-D686D363AB3A}" dt="2023-08-23T13:51:02.568" v="57"/>
+          <ac:spMkLst>
+            <pc:docMk/>
+            <pc:sldMk cId="4143296048" sldId="295"/>
+            <ac:spMk id="3" creationId="{C58DE4E5-ADFE-8EAA-C089-CFDA95078712}"/>
+          </ac:spMkLst>
+        </pc:spChg>
+        <pc:picChg chg="add mod">
+          <ac:chgData name="Samer Hasan Al Khatib" userId="68b7a22b-a3eb-4e08-a61f-646d81823754" providerId="ADAL" clId="{AAED9A61-9B94-455C-9872-D686D363AB3A}" dt="2023-08-23T13:51:08.472" v="59" actId="14100"/>
+          <ac:picMkLst>
+            <pc:docMk/>
+            <pc:sldMk cId="4143296048" sldId="295"/>
+            <ac:picMk id="5" creationId="{24C2A4A6-CA57-A263-2AFF-6A3F0DF4A3E6}"/>
+          </ac:picMkLst>
+        </pc:picChg>
+      </pc:sldChg>
+      <pc:sldChg chg="addSp delSp modSp new mod">
+        <pc:chgData name="Samer Hasan Al Khatib" userId="68b7a22b-a3eb-4e08-a61f-646d81823754" providerId="ADAL" clId="{AAED9A61-9B94-455C-9872-D686D363AB3A}" dt="2023-08-23T13:52:18.905" v="68" actId="1076"/>
+        <pc:sldMkLst>
+          <pc:docMk/>
+          <pc:sldMk cId="1757098919" sldId="296"/>
+        </pc:sldMkLst>
+        <pc:spChg chg="del">
+          <ac:chgData name="Samer Hasan Al Khatib" userId="68b7a22b-a3eb-4e08-a61f-646d81823754" providerId="ADAL" clId="{AAED9A61-9B94-455C-9872-D686D363AB3A}" dt="2023-08-23T13:52:05.264" v="61"/>
+          <ac:spMkLst>
+            <pc:docMk/>
+            <pc:sldMk cId="1757098919" sldId="296"/>
+            <ac:spMk id="3" creationId="{8FDA4826-E8E2-C5CE-1258-AF544DA059A7}"/>
+          </ac:spMkLst>
+        </pc:spChg>
+        <pc:picChg chg="add mod">
+          <ac:chgData name="Samer Hasan Al Khatib" userId="68b7a22b-a3eb-4e08-a61f-646d81823754" providerId="ADAL" clId="{AAED9A61-9B94-455C-9872-D686D363AB3A}" dt="2023-08-23T13:52:18.905" v="68" actId="1076"/>
+          <ac:picMkLst>
+            <pc:docMk/>
+            <pc:sldMk cId="1757098919" sldId="296"/>
+            <ac:picMk id="5" creationId="{1122CE5F-44F7-41B1-F95D-B41132C1EF97}"/>
+          </ac:picMkLst>
+        </pc:picChg>
+      </pc:sldChg>
+      <pc:sldChg chg="modSp new mod">
+        <pc:chgData name="Samer Hasan Al Khatib" userId="68b7a22b-a3eb-4e08-a61f-646d81823754" providerId="ADAL" clId="{AAED9A61-9B94-455C-9872-D686D363AB3A}" dt="2023-08-23T13:55:50.614" v="102" actId="20577"/>
+        <pc:sldMkLst>
+          <pc:docMk/>
+          <pc:sldMk cId="1306180161" sldId="297"/>
+        </pc:sldMkLst>
+        <pc:spChg chg="mod">
+          <ac:chgData name="Samer Hasan Al Khatib" userId="68b7a22b-a3eb-4e08-a61f-646d81823754" providerId="ADAL" clId="{AAED9A61-9B94-455C-9872-D686D363AB3A}" dt="2023-08-23T13:55:50.614" v="102" actId="20577"/>
+          <ac:spMkLst>
+            <pc:docMk/>
+            <pc:sldMk cId="1306180161" sldId="297"/>
+            <ac:spMk id="2" creationId="{0BBDE87A-9285-9DA0-4319-0738CA221ED7}"/>
+          </ac:spMkLst>
+        </pc:spChg>
+      </pc:sldChg>
+    </pc:docChg>
+  </pc:docChgLst>
   <pc:docChgLst>
     <pc:chgData name="Samer Hasan Al Khatib" userId="68b7a22b-a3eb-4e08-a61f-646d81823754" providerId="ADAL" clId="{EACED6A6-5A70-4A09-817F-9098F9BAC78C}"/>
     <pc:docChg chg="undo custSel addSld delSld modSld sldOrd">
@@ -1441,766 +2201,6 @@
       </pc:sldChg>
     </pc:docChg>
   </pc:docChgLst>
-  <pc:docChgLst>
-    <pc:chgData name="Samer Hasan Al Khatib" userId="68b7a22b-a3eb-4e08-a61f-646d81823754" providerId="ADAL" clId="{9429BEAE-70A6-4AEE-A37D-2075488C87F1}"/>
-    <pc:docChg chg="undo custSel addSld delSld modSld sldOrd">
-      <pc:chgData name="Samer Hasan Al Khatib" userId="68b7a22b-a3eb-4e08-a61f-646d81823754" providerId="ADAL" clId="{9429BEAE-70A6-4AEE-A37D-2075488C87F1}" dt="2023-09-05T14:57:12.034" v="1127" actId="14100"/>
-      <pc:docMkLst>
-        <pc:docMk/>
-      </pc:docMkLst>
-      <pc:sldChg chg="modSp new mod">
-        <pc:chgData name="Samer Hasan Al Khatib" userId="68b7a22b-a3eb-4e08-a61f-646d81823754" providerId="ADAL" clId="{9429BEAE-70A6-4AEE-A37D-2075488C87F1}" dt="2023-09-01T13:44:29.626" v="5" actId="14100"/>
-        <pc:sldMkLst>
-          <pc:docMk/>
-          <pc:sldMk cId="1366119606" sldId="335"/>
-        </pc:sldMkLst>
-        <pc:spChg chg="mod">
-          <ac:chgData name="Samer Hasan Al Khatib" userId="68b7a22b-a3eb-4e08-a61f-646d81823754" providerId="ADAL" clId="{9429BEAE-70A6-4AEE-A37D-2075488C87F1}" dt="2023-09-01T13:44:26.467" v="4" actId="1076"/>
-          <ac:spMkLst>
-            <pc:docMk/>
-            <pc:sldMk cId="1366119606" sldId="335"/>
-            <ac:spMk id="2" creationId="{128484A4-CF23-2EFA-96F6-48F9DABBCEBE}"/>
-          </ac:spMkLst>
-        </pc:spChg>
-        <pc:spChg chg="mod">
-          <ac:chgData name="Samer Hasan Al Khatib" userId="68b7a22b-a3eb-4e08-a61f-646d81823754" providerId="ADAL" clId="{9429BEAE-70A6-4AEE-A37D-2075488C87F1}" dt="2023-09-01T13:44:29.626" v="5" actId="14100"/>
-          <ac:spMkLst>
-            <pc:docMk/>
-            <pc:sldMk cId="1366119606" sldId="335"/>
-            <ac:spMk id="3" creationId="{3E84297B-127A-7B94-4711-7E2F7EAC6427}"/>
-          </ac:spMkLst>
-        </pc:spChg>
-      </pc:sldChg>
-      <pc:sldChg chg="modSp new mod ord">
-        <pc:chgData name="Samer Hasan Al Khatib" userId="68b7a22b-a3eb-4e08-a61f-646d81823754" providerId="ADAL" clId="{9429BEAE-70A6-4AEE-A37D-2075488C87F1}" dt="2023-09-02T17:52:59.942" v="265"/>
-        <pc:sldMkLst>
-          <pc:docMk/>
-          <pc:sldMk cId="4266254586" sldId="336"/>
-        </pc:sldMkLst>
-        <pc:spChg chg="mod">
-          <ac:chgData name="Samer Hasan Al Khatib" userId="68b7a22b-a3eb-4e08-a61f-646d81823754" providerId="ADAL" clId="{9429BEAE-70A6-4AEE-A37D-2075488C87F1}" dt="2023-09-01T13:59:31.669" v="11" actId="27636"/>
-          <ac:spMkLst>
-            <pc:docMk/>
-            <pc:sldMk cId="4266254586" sldId="336"/>
-            <ac:spMk id="2" creationId="{CE63236D-0B0F-D43B-767A-C25DB4DEAC70}"/>
-          </ac:spMkLst>
-        </pc:spChg>
-        <pc:spChg chg="mod">
-          <ac:chgData name="Samer Hasan Al Khatib" userId="68b7a22b-a3eb-4e08-a61f-646d81823754" providerId="ADAL" clId="{9429BEAE-70A6-4AEE-A37D-2075488C87F1}" dt="2023-09-02T17:52:59.942" v="265"/>
-          <ac:spMkLst>
-            <pc:docMk/>
-            <pc:sldMk cId="4266254586" sldId="336"/>
-            <ac:spMk id="3" creationId="{9DB0BEFF-39BE-E31C-91DD-62E2FF873C22}"/>
-          </ac:spMkLst>
-        </pc:spChg>
-      </pc:sldChg>
-      <pc:sldChg chg="modSp new mod">
-        <pc:chgData name="Samer Hasan Al Khatib" userId="68b7a22b-a3eb-4e08-a61f-646d81823754" providerId="ADAL" clId="{9429BEAE-70A6-4AEE-A37D-2075488C87F1}" dt="2023-09-02T17:41:43.291" v="115" actId="20577"/>
-        <pc:sldMkLst>
-          <pc:docMk/>
-          <pc:sldMk cId="854968803" sldId="337"/>
-        </pc:sldMkLst>
-        <pc:spChg chg="mod">
-          <ac:chgData name="Samer Hasan Al Khatib" userId="68b7a22b-a3eb-4e08-a61f-646d81823754" providerId="ADAL" clId="{9429BEAE-70A6-4AEE-A37D-2075488C87F1}" dt="2023-09-02T17:38:12.305" v="24" actId="1076"/>
-          <ac:spMkLst>
-            <pc:docMk/>
-            <pc:sldMk cId="854968803" sldId="337"/>
-            <ac:spMk id="2" creationId="{E9660416-635C-F38D-4114-E8DE51270D6E}"/>
-          </ac:spMkLst>
-        </pc:spChg>
-        <pc:spChg chg="mod">
-          <ac:chgData name="Samer Hasan Al Khatib" userId="68b7a22b-a3eb-4e08-a61f-646d81823754" providerId="ADAL" clId="{9429BEAE-70A6-4AEE-A37D-2075488C87F1}" dt="2023-09-02T17:41:43.291" v="115" actId="20577"/>
-          <ac:spMkLst>
-            <pc:docMk/>
-            <pc:sldMk cId="854968803" sldId="337"/>
-            <ac:spMk id="3" creationId="{7ACDC8AB-7ED4-F9C9-530B-DD27976653B6}"/>
-          </ac:spMkLst>
-        </pc:spChg>
-      </pc:sldChg>
-      <pc:sldChg chg="addSp delSp modSp new mod">
-        <pc:chgData name="Samer Hasan Al Khatib" userId="68b7a22b-a3eb-4e08-a61f-646d81823754" providerId="ADAL" clId="{9429BEAE-70A6-4AEE-A37D-2075488C87F1}" dt="2023-09-02T17:45:59.708" v="158" actId="6549"/>
-        <pc:sldMkLst>
-          <pc:docMk/>
-          <pc:sldMk cId="3450425002" sldId="338"/>
-        </pc:sldMkLst>
-        <pc:spChg chg="mod">
-          <ac:chgData name="Samer Hasan Al Khatib" userId="68b7a22b-a3eb-4e08-a61f-646d81823754" providerId="ADAL" clId="{9429BEAE-70A6-4AEE-A37D-2075488C87F1}" dt="2023-09-02T17:42:53.594" v="120" actId="27636"/>
-          <ac:spMkLst>
-            <pc:docMk/>
-            <pc:sldMk cId="3450425002" sldId="338"/>
-            <ac:spMk id="2" creationId="{D3ACC331-C6FF-3F50-19A3-98CE3122FA23}"/>
-          </ac:spMkLst>
-        </pc:spChg>
-        <pc:spChg chg="mod">
-          <ac:chgData name="Samer Hasan Al Khatib" userId="68b7a22b-a3eb-4e08-a61f-646d81823754" providerId="ADAL" clId="{9429BEAE-70A6-4AEE-A37D-2075488C87F1}" dt="2023-09-02T17:45:59.708" v="158" actId="6549"/>
-          <ac:spMkLst>
-            <pc:docMk/>
-            <pc:sldMk cId="3450425002" sldId="338"/>
-            <ac:spMk id="3" creationId="{B6314935-B04D-57B2-B8FE-1379F10E937A}"/>
-          </ac:spMkLst>
-        </pc:spChg>
-        <pc:spChg chg="add del">
-          <ac:chgData name="Samer Hasan Al Khatib" userId="68b7a22b-a3eb-4e08-a61f-646d81823754" providerId="ADAL" clId="{9429BEAE-70A6-4AEE-A37D-2075488C87F1}" dt="2023-09-02T17:43:47.135" v="129"/>
-          <ac:spMkLst>
-            <pc:docMk/>
-            <pc:sldMk cId="3450425002" sldId="338"/>
-            <ac:spMk id="4" creationId="{F645C4A1-A47F-48FE-4ABD-86EBC60BF513}"/>
-          </ac:spMkLst>
-        </pc:spChg>
-        <pc:spChg chg="add del mod">
-          <ac:chgData name="Samer Hasan Al Khatib" userId="68b7a22b-a3eb-4e08-a61f-646d81823754" providerId="ADAL" clId="{9429BEAE-70A6-4AEE-A37D-2075488C87F1}" dt="2023-09-02T17:43:46.769" v="128"/>
-          <ac:spMkLst>
-            <pc:docMk/>
-            <pc:sldMk cId="3450425002" sldId="338"/>
-            <ac:spMk id="5" creationId="{EA45F680-C534-A762-49F5-EF4244FCE3FF}"/>
-          </ac:spMkLst>
-        </pc:spChg>
-        <pc:spChg chg="add del mod">
-          <ac:chgData name="Samer Hasan Al Khatib" userId="68b7a22b-a3eb-4e08-a61f-646d81823754" providerId="ADAL" clId="{9429BEAE-70A6-4AEE-A37D-2075488C87F1}" dt="2023-09-02T17:43:46.549" v="127"/>
-          <ac:spMkLst>
-            <pc:docMk/>
-            <pc:sldMk cId="3450425002" sldId="338"/>
-            <ac:spMk id="6" creationId="{F0C63229-A471-38BE-C65C-EEA5B6887989}"/>
-          </ac:spMkLst>
-        </pc:spChg>
-        <pc:spChg chg="add del">
-          <ac:chgData name="Samer Hasan Al Khatib" userId="68b7a22b-a3eb-4e08-a61f-646d81823754" providerId="ADAL" clId="{9429BEAE-70A6-4AEE-A37D-2075488C87F1}" dt="2023-09-02T17:43:49.496" v="131"/>
-          <ac:spMkLst>
-            <pc:docMk/>
-            <pc:sldMk cId="3450425002" sldId="338"/>
-            <ac:spMk id="7" creationId="{E4A7DB54-2F30-9251-F2C9-218D2365A5A8}"/>
-          </ac:spMkLst>
-        </pc:spChg>
-        <pc:spChg chg="add del">
-          <ac:chgData name="Samer Hasan Al Khatib" userId="68b7a22b-a3eb-4e08-a61f-646d81823754" providerId="ADAL" clId="{9429BEAE-70A6-4AEE-A37D-2075488C87F1}" dt="2023-09-02T17:43:53.448" v="133"/>
-          <ac:spMkLst>
-            <pc:docMk/>
-            <pc:sldMk cId="3450425002" sldId="338"/>
-            <ac:spMk id="8" creationId="{0192E085-CB50-23F8-7CE7-A107A9334C7D}"/>
-          </ac:spMkLst>
-        </pc:spChg>
-      </pc:sldChg>
-      <pc:sldChg chg="addSp delSp modSp new mod">
-        <pc:chgData name="Samer Hasan Al Khatib" userId="68b7a22b-a3eb-4e08-a61f-646d81823754" providerId="ADAL" clId="{9429BEAE-70A6-4AEE-A37D-2075488C87F1}" dt="2023-09-02T17:48:04.773" v="199" actId="1076"/>
-        <pc:sldMkLst>
-          <pc:docMk/>
-          <pc:sldMk cId="103963602" sldId="339"/>
-        </pc:sldMkLst>
-        <pc:spChg chg="mod">
-          <ac:chgData name="Samer Hasan Al Khatib" userId="68b7a22b-a3eb-4e08-a61f-646d81823754" providerId="ADAL" clId="{9429BEAE-70A6-4AEE-A37D-2075488C87F1}" dt="2023-09-02T17:46:16.494" v="165" actId="27636"/>
-          <ac:spMkLst>
-            <pc:docMk/>
-            <pc:sldMk cId="103963602" sldId="339"/>
-            <ac:spMk id="2" creationId="{1E82F415-7EE3-27B8-5266-A5354C99E55B}"/>
-          </ac:spMkLst>
-        </pc:spChg>
-        <pc:spChg chg="del mod">
-          <ac:chgData name="Samer Hasan Al Khatib" userId="68b7a22b-a3eb-4e08-a61f-646d81823754" providerId="ADAL" clId="{9429BEAE-70A6-4AEE-A37D-2075488C87F1}" dt="2023-09-02T17:46:33.278" v="167"/>
-          <ac:spMkLst>
-            <pc:docMk/>
-            <pc:sldMk cId="103963602" sldId="339"/>
-            <ac:spMk id="3" creationId="{B6076558-6A4A-B9E0-EE9D-8C840DF560B4}"/>
-          </ac:spMkLst>
-        </pc:spChg>
-        <pc:spChg chg="add mod">
-          <ac:chgData name="Samer Hasan Al Khatib" userId="68b7a22b-a3eb-4e08-a61f-646d81823754" providerId="ADAL" clId="{9429BEAE-70A6-4AEE-A37D-2075488C87F1}" dt="2023-09-02T17:47:51.247" v="196" actId="1076"/>
-          <ac:spMkLst>
-            <pc:docMk/>
-            <pc:sldMk cId="103963602" sldId="339"/>
-            <ac:spMk id="4" creationId="{881C4D7F-3B2F-E13F-DE2C-E35E2623ED21}"/>
-          </ac:spMkLst>
-        </pc:spChg>
-        <pc:spChg chg="add del mod">
-          <ac:chgData name="Samer Hasan Al Khatib" userId="68b7a22b-a3eb-4e08-a61f-646d81823754" providerId="ADAL" clId="{9429BEAE-70A6-4AEE-A37D-2075488C87F1}" dt="2023-09-02T17:48:04.773" v="199" actId="1076"/>
-          <ac:spMkLst>
-            <pc:docMk/>
-            <pc:sldMk cId="103963602" sldId="339"/>
-            <ac:spMk id="5" creationId="{C099611B-49A8-4297-2E48-A426AED13F5A}"/>
-          </ac:spMkLst>
-        </pc:spChg>
-      </pc:sldChg>
-      <pc:sldChg chg="addSp delSp modSp new mod">
-        <pc:chgData name="Samer Hasan Al Khatib" userId="68b7a22b-a3eb-4e08-a61f-646d81823754" providerId="ADAL" clId="{9429BEAE-70A6-4AEE-A37D-2075488C87F1}" dt="2023-09-02T17:50:16.202" v="235" actId="1076"/>
-        <pc:sldMkLst>
-          <pc:docMk/>
-          <pc:sldMk cId="4125225834" sldId="340"/>
-        </pc:sldMkLst>
-        <pc:spChg chg="mod">
-          <ac:chgData name="Samer Hasan Al Khatib" userId="68b7a22b-a3eb-4e08-a61f-646d81823754" providerId="ADAL" clId="{9429BEAE-70A6-4AEE-A37D-2075488C87F1}" dt="2023-09-02T17:48:27.279" v="205" actId="27636"/>
-          <ac:spMkLst>
-            <pc:docMk/>
-            <pc:sldMk cId="4125225834" sldId="340"/>
-            <ac:spMk id="2" creationId="{D5C625E9-1C3B-84DD-AD4B-701EF81C48DA}"/>
-          </ac:spMkLst>
-        </pc:spChg>
-        <pc:spChg chg="mod">
-          <ac:chgData name="Samer Hasan Al Khatib" userId="68b7a22b-a3eb-4e08-a61f-646d81823754" providerId="ADAL" clId="{9429BEAE-70A6-4AEE-A37D-2075488C87F1}" dt="2023-09-02T17:49:04.490" v="211" actId="14100"/>
-          <ac:spMkLst>
-            <pc:docMk/>
-            <pc:sldMk cId="4125225834" sldId="340"/>
-            <ac:spMk id="3" creationId="{392D0B9D-CE99-28E6-1471-8619E39D48A3}"/>
-          </ac:spMkLst>
-        </pc:spChg>
-        <pc:spChg chg="add del mod">
-          <ac:chgData name="Samer Hasan Al Khatib" userId="68b7a22b-a3eb-4e08-a61f-646d81823754" providerId="ADAL" clId="{9429BEAE-70A6-4AEE-A37D-2075488C87F1}" dt="2023-09-02T17:49:36.827" v="224"/>
-          <ac:spMkLst>
-            <pc:docMk/>
-            <pc:sldMk cId="4125225834" sldId="340"/>
-            <ac:spMk id="4" creationId="{A596E743-122E-EA99-3950-273C7984AA4F}"/>
-          </ac:spMkLst>
-        </pc:spChg>
-        <pc:spChg chg="add mod">
-          <ac:chgData name="Samer Hasan Al Khatib" userId="68b7a22b-a3eb-4e08-a61f-646d81823754" providerId="ADAL" clId="{9429BEAE-70A6-4AEE-A37D-2075488C87F1}" dt="2023-09-02T17:50:16.202" v="235" actId="1076"/>
-          <ac:spMkLst>
-            <pc:docMk/>
-            <pc:sldMk cId="4125225834" sldId="340"/>
-            <ac:spMk id="5" creationId="{338324EB-A1D1-06AF-005F-82FD91D91466}"/>
-          </ac:spMkLst>
-        </pc:spChg>
-      </pc:sldChg>
-      <pc:sldChg chg="addSp delSp modSp new mod">
-        <pc:chgData name="Samer Hasan Al Khatib" userId="68b7a22b-a3eb-4e08-a61f-646d81823754" providerId="ADAL" clId="{9429BEAE-70A6-4AEE-A37D-2075488C87F1}" dt="2023-09-02T17:51:04.505" v="248" actId="20577"/>
-        <pc:sldMkLst>
-          <pc:docMk/>
-          <pc:sldMk cId="3309568132" sldId="341"/>
-        </pc:sldMkLst>
-        <pc:spChg chg="mod">
-          <ac:chgData name="Samer Hasan Al Khatib" userId="68b7a22b-a3eb-4e08-a61f-646d81823754" providerId="ADAL" clId="{9429BEAE-70A6-4AEE-A37D-2075488C87F1}" dt="2023-09-02T17:50:38.866" v="240" actId="14100"/>
-          <ac:spMkLst>
-            <pc:docMk/>
-            <pc:sldMk cId="3309568132" sldId="341"/>
-            <ac:spMk id="2" creationId="{94089F39-AD74-21E2-0C33-8EE5AF9DBEB8}"/>
-          </ac:spMkLst>
-        </pc:spChg>
-        <pc:spChg chg="del">
-          <ac:chgData name="Samer Hasan Al Khatib" userId="68b7a22b-a3eb-4e08-a61f-646d81823754" providerId="ADAL" clId="{9429BEAE-70A6-4AEE-A37D-2075488C87F1}" dt="2023-09-02T17:50:50.545" v="241"/>
-          <ac:spMkLst>
-            <pc:docMk/>
-            <pc:sldMk cId="3309568132" sldId="341"/>
-            <ac:spMk id="3" creationId="{C4D1A68E-DCEA-81A3-2ADC-F6F0D3AD36FA}"/>
-          </ac:spMkLst>
-        </pc:spChg>
-        <pc:spChg chg="add mod">
-          <ac:chgData name="Samer Hasan Al Khatib" userId="68b7a22b-a3eb-4e08-a61f-646d81823754" providerId="ADAL" clId="{9429BEAE-70A6-4AEE-A37D-2075488C87F1}" dt="2023-09-02T17:51:04.505" v="248" actId="20577"/>
-          <ac:spMkLst>
-            <pc:docMk/>
-            <pc:sldMk cId="3309568132" sldId="341"/>
-            <ac:spMk id="4" creationId="{F01962C4-C2CE-3F3C-5A92-78234984A99F}"/>
-          </ac:spMkLst>
-        </pc:spChg>
-      </pc:sldChg>
-      <pc:sldChg chg="addSp delSp modSp new mod">
-        <pc:chgData name="Samer Hasan Al Khatib" userId="68b7a22b-a3eb-4e08-a61f-646d81823754" providerId="ADAL" clId="{9429BEAE-70A6-4AEE-A37D-2075488C87F1}" dt="2023-09-02T17:51:34.882" v="256" actId="20577"/>
-        <pc:sldMkLst>
-          <pc:docMk/>
-          <pc:sldMk cId="2377643007" sldId="342"/>
-        </pc:sldMkLst>
-        <pc:spChg chg="mod">
-          <ac:chgData name="Samer Hasan Al Khatib" userId="68b7a22b-a3eb-4e08-a61f-646d81823754" providerId="ADAL" clId="{9429BEAE-70A6-4AEE-A37D-2075488C87F1}" dt="2023-09-02T17:51:21.079" v="253" actId="14100"/>
-          <ac:spMkLst>
-            <pc:docMk/>
-            <pc:sldMk cId="2377643007" sldId="342"/>
-            <ac:spMk id="2" creationId="{08E799A4-B4FE-E9E5-4327-D8CEB19864A2}"/>
-          </ac:spMkLst>
-        </pc:spChg>
-        <pc:spChg chg="del">
-          <ac:chgData name="Samer Hasan Al Khatib" userId="68b7a22b-a3eb-4e08-a61f-646d81823754" providerId="ADAL" clId="{9429BEAE-70A6-4AEE-A37D-2075488C87F1}" dt="2023-09-02T17:51:28.597" v="254"/>
-          <ac:spMkLst>
-            <pc:docMk/>
-            <pc:sldMk cId="2377643007" sldId="342"/>
-            <ac:spMk id="3" creationId="{49AEC45F-91DD-BB86-ABC6-B631EE955878}"/>
-          </ac:spMkLst>
-        </pc:spChg>
-        <pc:spChg chg="add mod">
-          <ac:chgData name="Samer Hasan Al Khatib" userId="68b7a22b-a3eb-4e08-a61f-646d81823754" providerId="ADAL" clId="{9429BEAE-70A6-4AEE-A37D-2075488C87F1}" dt="2023-09-02T17:51:34.882" v="256" actId="20577"/>
-          <ac:spMkLst>
-            <pc:docMk/>
-            <pc:sldMk cId="2377643007" sldId="342"/>
-            <ac:spMk id="4" creationId="{1F9AEB82-0465-AE90-5207-7DB1222B9627}"/>
-          </ac:spMkLst>
-        </pc:spChg>
-      </pc:sldChg>
-      <pc:sldChg chg="addSp delSp modSp new mod">
-        <pc:chgData name="Samer Hasan Al Khatib" userId="68b7a22b-a3eb-4e08-a61f-646d81823754" providerId="ADAL" clId="{9429BEAE-70A6-4AEE-A37D-2075488C87F1}" dt="2023-09-02T17:52:04.424" v="263" actId="20577"/>
-        <pc:sldMkLst>
-          <pc:docMk/>
-          <pc:sldMk cId="3845583410" sldId="343"/>
-        </pc:sldMkLst>
-        <pc:spChg chg="mod">
-          <ac:chgData name="Samer Hasan Al Khatib" userId="68b7a22b-a3eb-4e08-a61f-646d81823754" providerId="ADAL" clId="{9429BEAE-70A6-4AEE-A37D-2075488C87F1}" dt="2023-09-02T17:51:53.174" v="261" actId="14100"/>
-          <ac:spMkLst>
-            <pc:docMk/>
-            <pc:sldMk cId="3845583410" sldId="343"/>
-            <ac:spMk id="2" creationId="{C0758739-3100-6D29-5173-2C2DC932A22D}"/>
-          </ac:spMkLst>
-        </pc:spChg>
-        <pc:spChg chg="del">
-          <ac:chgData name="Samer Hasan Al Khatib" userId="68b7a22b-a3eb-4e08-a61f-646d81823754" providerId="ADAL" clId="{9429BEAE-70A6-4AEE-A37D-2075488C87F1}" dt="2023-09-02T17:52:01.764" v="262"/>
-          <ac:spMkLst>
-            <pc:docMk/>
-            <pc:sldMk cId="3845583410" sldId="343"/>
-            <ac:spMk id="3" creationId="{946A58D2-6AE0-1DAB-85DA-632EDFF2B373}"/>
-          </ac:spMkLst>
-        </pc:spChg>
-        <pc:spChg chg="add mod">
-          <ac:chgData name="Samer Hasan Al Khatib" userId="68b7a22b-a3eb-4e08-a61f-646d81823754" providerId="ADAL" clId="{9429BEAE-70A6-4AEE-A37D-2075488C87F1}" dt="2023-09-02T17:52:04.424" v="263" actId="20577"/>
-          <ac:spMkLst>
-            <pc:docMk/>
-            <pc:sldMk cId="3845583410" sldId="343"/>
-            <ac:spMk id="4" creationId="{CDF42390-C4C2-63E3-000E-62C8D0C7B6DC}"/>
-          </ac:spMkLst>
-        </pc:spChg>
-      </pc:sldChg>
-      <pc:sldChg chg="addSp delSp modSp new mod setBg">
-        <pc:chgData name="Samer Hasan Al Khatib" userId="68b7a22b-a3eb-4e08-a61f-646d81823754" providerId="ADAL" clId="{9429BEAE-70A6-4AEE-A37D-2075488C87F1}" dt="2023-09-03T14:34:21.843" v="432" actId="26606"/>
-        <pc:sldMkLst>
-          <pc:docMk/>
-          <pc:sldMk cId="1839542533" sldId="344"/>
-        </pc:sldMkLst>
-        <pc:spChg chg="mod">
-          <ac:chgData name="Samer Hasan Al Khatib" userId="68b7a22b-a3eb-4e08-a61f-646d81823754" providerId="ADAL" clId="{9429BEAE-70A6-4AEE-A37D-2075488C87F1}" dt="2023-09-03T14:34:21.843" v="432" actId="26606"/>
-          <ac:spMkLst>
-            <pc:docMk/>
-            <pc:sldMk cId="1839542533" sldId="344"/>
-            <ac:spMk id="2" creationId="{D43A4F26-5F5B-AFFD-5D20-61193A0BA276}"/>
-          </ac:spMkLst>
-        </pc:spChg>
-        <pc:spChg chg="add del mod">
-          <ac:chgData name="Samer Hasan Al Khatib" userId="68b7a22b-a3eb-4e08-a61f-646d81823754" providerId="ADAL" clId="{9429BEAE-70A6-4AEE-A37D-2075488C87F1}" dt="2023-09-03T14:34:21.843" v="432" actId="26606"/>
-          <ac:spMkLst>
-            <pc:docMk/>
-            <pc:sldMk cId="1839542533" sldId="344"/>
-            <ac:spMk id="3" creationId="{FC76A734-F9DC-76C5-85A1-49E007129E90}"/>
-          </ac:spMkLst>
-        </pc:spChg>
-        <pc:spChg chg="add">
-          <ac:chgData name="Samer Hasan Al Khatib" userId="68b7a22b-a3eb-4e08-a61f-646d81823754" providerId="ADAL" clId="{9429BEAE-70A6-4AEE-A37D-2075488C87F1}" dt="2023-09-03T14:34:21.843" v="432" actId="26606"/>
-          <ac:spMkLst>
-            <pc:docMk/>
-            <pc:sldMk cId="1839542533" sldId="344"/>
-            <ac:spMk id="8" creationId="{FC76A734-F9DC-76C5-85A1-49E007129E90}"/>
-          </ac:spMkLst>
-        </pc:spChg>
-        <pc:graphicFrameChg chg="add del">
-          <ac:chgData name="Samer Hasan Al Khatib" userId="68b7a22b-a3eb-4e08-a61f-646d81823754" providerId="ADAL" clId="{9429BEAE-70A6-4AEE-A37D-2075488C87F1}" dt="2023-09-03T14:34:21.767" v="431" actId="26606"/>
-          <ac:graphicFrameMkLst>
-            <pc:docMk/>
-            <pc:sldMk cId="1839542533" sldId="344"/>
-            <ac:graphicFrameMk id="5" creationId="{9CBDAF1C-B040-C5BD-4216-BD73183F1EB4}"/>
-          </ac:graphicFrameMkLst>
-        </pc:graphicFrameChg>
-        <pc:picChg chg="add">
-          <ac:chgData name="Samer Hasan Al Khatib" userId="68b7a22b-a3eb-4e08-a61f-646d81823754" providerId="ADAL" clId="{9429BEAE-70A6-4AEE-A37D-2075488C87F1}" dt="2023-09-03T14:34:21.843" v="432" actId="26606"/>
-          <ac:picMkLst>
-            <pc:docMk/>
-            <pc:sldMk cId="1839542533" sldId="344"/>
-            <ac:picMk id="7" creationId="{7FB392F8-67BC-B7CF-75FA-599FF7024A53}"/>
-          </ac:picMkLst>
-        </pc:picChg>
-      </pc:sldChg>
-      <pc:sldChg chg="addSp delSp modSp new mod">
-        <pc:chgData name="Samer Hasan Al Khatib" userId="68b7a22b-a3eb-4e08-a61f-646d81823754" providerId="ADAL" clId="{9429BEAE-70A6-4AEE-A37D-2075488C87F1}" dt="2023-09-02T17:58:51.543" v="290" actId="1076"/>
-        <pc:sldMkLst>
-          <pc:docMk/>
-          <pc:sldMk cId="3698680020" sldId="345"/>
-        </pc:sldMkLst>
-        <pc:spChg chg="del">
-          <ac:chgData name="Samer Hasan Al Khatib" userId="68b7a22b-a3eb-4e08-a61f-646d81823754" providerId="ADAL" clId="{9429BEAE-70A6-4AEE-A37D-2075488C87F1}" dt="2023-09-02T17:58:47.163" v="288" actId="478"/>
-          <ac:spMkLst>
-            <pc:docMk/>
-            <pc:sldMk cId="3698680020" sldId="345"/>
-            <ac:spMk id="2" creationId="{630D9DCD-45AC-5CAB-252D-4FA4ED730F41}"/>
-          </ac:spMkLst>
-        </pc:spChg>
-        <pc:spChg chg="del">
-          <ac:chgData name="Samer Hasan Al Khatib" userId="68b7a22b-a3eb-4e08-a61f-646d81823754" providerId="ADAL" clId="{9429BEAE-70A6-4AEE-A37D-2075488C87F1}" dt="2023-09-02T17:58:48.355" v="289" actId="478"/>
-          <ac:spMkLst>
-            <pc:docMk/>
-            <pc:sldMk cId="3698680020" sldId="345"/>
-            <ac:spMk id="3" creationId="{7BD4F107-6AC8-75D6-F23D-838576FA0CC3}"/>
-          </ac:spMkLst>
-        </pc:spChg>
-        <pc:picChg chg="add mod">
-          <ac:chgData name="Samer Hasan Al Khatib" userId="68b7a22b-a3eb-4e08-a61f-646d81823754" providerId="ADAL" clId="{9429BEAE-70A6-4AEE-A37D-2075488C87F1}" dt="2023-09-02T17:58:51.543" v="290" actId="1076"/>
-          <ac:picMkLst>
-            <pc:docMk/>
-            <pc:sldMk cId="3698680020" sldId="345"/>
-            <ac:picMk id="7170" creationId="{89CC6480-0824-DF51-6C4A-58259B50335D}"/>
-          </ac:picMkLst>
-        </pc:picChg>
-      </pc:sldChg>
-      <pc:sldChg chg="modSp new mod">
-        <pc:chgData name="Samer Hasan Al Khatib" userId="68b7a22b-a3eb-4e08-a61f-646d81823754" providerId="ADAL" clId="{9429BEAE-70A6-4AEE-A37D-2075488C87F1}" dt="2023-09-02T18:02:25.623" v="301" actId="27636"/>
-        <pc:sldMkLst>
-          <pc:docMk/>
-          <pc:sldMk cId="3263991133" sldId="346"/>
-        </pc:sldMkLst>
-        <pc:spChg chg="mod">
-          <ac:chgData name="Samer Hasan Al Khatib" userId="68b7a22b-a3eb-4e08-a61f-646d81823754" providerId="ADAL" clId="{9429BEAE-70A6-4AEE-A37D-2075488C87F1}" dt="2023-09-02T18:01:59.384" v="296" actId="27636"/>
-          <ac:spMkLst>
-            <pc:docMk/>
-            <pc:sldMk cId="3263991133" sldId="346"/>
-            <ac:spMk id="2" creationId="{144256B3-F229-71D9-6A29-A672393957A0}"/>
-          </ac:spMkLst>
-        </pc:spChg>
-        <pc:spChg chg="mod">
-          <ac:chgData name="Samer Hasan Al Khatib" userId="68b7a22b-a3eb-4e08-a61f-646d81823754" providerId="ADAL" clId="{9429BEAE-70A6-4AEE-A37D-2075488C87F1}" dt="2023-09-02T18:02:25.623" v="301" actId="27636"/>
-          <ac:spMkLst>
-            <pc:docMk/>
-            <pc:sldMk cId="3263991133" sldId="346"/>
-            <ac:spMk id="3" creationId="{67F8C439-C7FD-E60E-AED3-2E44404CB2D0}"/>
-          </ac:spMkLst>
-        </pc:spChg>
-      </pc:sldChg>
-      <pc:sldChg chg="modSp new mod">
-        <pc:chgData name="Samer Hasan Al Khatib" userId="68b7a22b-a3eb-4e08-a61f-646d81823754" providerId="ADAL" clId="{9429BEAE-70A6-4AEE-A37D-2075488C87F1}" dt="2023-09-03T13:00:25.816" v="365" actId="6549"/>
-        <pc:sldMkLst>
-          <pc:docMk/>
-          <pc:sldMk cId="4246500147" sldId="348"/>
-        </pc:sldMkLst>
-        <pc:spChg chg="mod">
-          <ac:chgData name="Samer Hasan Al Khatib" userId="68b7a22b-a3eb-4e08-a61f-646d81823754" providerId="ADAL" clId="{9429BEAE-70A6-4AEE-A37D-2075488C87F1}" dt="2023-09-03T12:57:52.610" v="349" actId="20577"/>
-          <ac:spMkLst>
-            <pc:docMk/>
-            <pc:sldMk cId="4246500147" sldId="348"/>
-            <ac:spMk id="2" creationId="{8DBAE410-6367-79F2-EAB1-7BAA3F881A69}"/>
-          </ac:spMkLst>
-        </pc:spChg>
-        <pc:spChg chg="mod">
-          <ac:chgData name="Samer Hasan Al Khatib" userId="68b7a22b-a3eb-4e08-a61f-646d81823754" providerId="ADAL" clId="{9429BEAE-70A6-4AEE-A37D-2075488C87F1}" dt="2023-09-03T13:00:25.816" v="365" actId="6549"/>
-          <ac:spMkLst>
-            <pc:docMk/>
-            <pc:sldMk cId="4246500147" sldId="348"/>
-            <ac:spMk id="3" creationId="{F1BCFDBE-1422-64E9-0E2C-82E41B719649}"/>
-          </ac:spMkLst>
-        </pc:spChg>
-      </pc:sldChg>
-      <pc:sldChg chg="modSp new mod">
-        <pc:chgData name="Samer Hasan Al Khatib" userId="68b7a22b-a3eb-4e08-a61f-646d81823754" providerId="ADAL" clId="{9429BEAE-70A6-4AEE-A37D-2075488C87F1}" dt="2023-09-03T13:01:45.816" v="384" actId="313"/>
-        <pc:sldMkLst>
-          <pc:docMk/>
-          <pc:sldMk cId="4105843879" sldId="349"/>
-        </pc:sldMkLst>
-        <pc:spChg chg="mod">
-          <ac:chgData name="Samer Hasan Al Khatib" userId="68b7a22b-a3eb-4e08-a61f-646d81823754" providerId="ADAL" clId="{9429BEAE-70A6-4AEE-A37D-2075488C87F1}" dt="2023-09-03T13:01:45.816" v="384" actId="313"/>
-          <ac:spMkLst>
-            <pc:docMk/>
-            <pc:sldMk cId="4105843879" sldId="349"/>
-            <ac:spMk id="2" creationId="{6B6ED9A3-6126-CA94-1220-61D69430995C}"/>
-          </ac:spMkLst>
-        </pc:spChg>
-        <pc:spChg chg="mod">
-          <ac:chgData name="Samer Hasan Al Khatib" userId="68b7a22b-a3eb-4e08-a61f-646d81823754" providerId="ADAL" clId="{9429BEAE-70A6-4AEE-A37D-2075488C87F1}" dt="2023-09-03T13:01:38.872" v="383"/>
-          <ac:spMkLst>
-            <pc:docMk/>
-            <pc:sldMk cId="4105843879" sldId="349"/>
-            <ac:spMk id="3" creationId="{84E280F6-E812-A2EE-2F66-B275370468BB}"/>
-          </ac:spMkLst>
-        </pc:spChg>
-      </pc:sldChg>
-      <pc:sldChg chg="delSp modSp new mod">
-        <pc:chgData name="Samer Hasan Al Khatib" userId="68b7a22b-a3eb-4e08-a61f-646d81823754" providerId="ADAL" clId="{9429BEAE-70A6-4AEE-A37D-2075488C87F1}" dt="2023-09-03T13:02:15.230" v="389" actId="12"/>
-        <pc:sldMkLst>
-          <pc:docMk/>
-          <pc:sldMk cId="1980642118" sldId="350"/>
-        </pc:sldMkLst>
-        <pc:spChg chg="del">
-          <ac:chgData name="Samer Hasan Al Khatib" userId="68b7a22b-a3eb-4e08-a61f-646d81823754" providerId="ADAL" clId="{9429BEAE-70A6-4AEE-A37D-2075488C87F1}" dt="2023-09-03T13:02:07.769" v="386" actId="478"/>
-          <ac:spMkLst>
-            <pc:docMk/>
-            <pc:sldMk cId="1980642118" sldId="350"/>
-            <ac:spMk id="2" creationId="{8B6FE329-2BB6-0611-861B-7586FC9CAABC}"/>
-          </ac:spMkLst>
-        </pc:spChg>
-        <pc:spChg chg="mod">
-          <ac:chgData name="Samer Hasan Al Khatib" userId="68b7a22b-a3eb-4e08-a61f-646d81823754" providerId="ADAL" clId="{9429BEAE-70A6-4AEE-A37D-2075488C87F1}" dt="2023-09-03T13:02:15.230" v="389" actId="12"/>
-          <ac:spMkLst>
-            <pc:docMk/>
-            <pc:sldMk cId="1980642118" sldId="350"/>
-            <ac:spMk id="3" creationId="{C1522645-8F1B-3C73-7B01-C3848CB2CBBE}"/>
-          </ac:spMkLst>
-        </pc:spChg>
-      </pc:sldChg>
-      <pc:sldChg chg="modSp new mod">
-        <pc:chgData name="Samer Hasan Al Khatib" userId="68b7a22b-a3eb-4e08-a61f-646d81823754" providerId="ADAL" clId="{9429BEAE-70A6-4AEE-A37D-2075488C87F1}" dt="2023-09-03T13:10:07.529" v="421" actId="12"/>
-        <pc:sldMkLst>
-          <pc:docMk/>
-          <pc:sldMk cId="1354391041" sldId="351"/>
-        </pc:sldMkLst>
-        <pc:spChg chg="mod">
-          <ac:chgData name="Samer Hasan Al Khatib" userId="68b7a22b-a3eb-4e08-a61f-646d81823754" providerId="ADAL" clId="{9429BEAE-70A6-4AEE-A37D-2075488C87F1}" dt="2023-09-03T13:10:00.430" v="418" actId="20577"/>
-          <ac:spMkLst>
-            <pc:docMk/>
-            <pc:sldMk cId="1354391041" sldId="351"/>
-            <ac:spMk id="2" creationId="{54D91B2A-FBC6-B27E-B119-3AD62A04EC17}"/>
-          </ac:spMkLst>
-        </pc:spChg>
-        <pc:spChg chg="mod">
-          <ac:chgData name="Samer Hasan Al Khatib" userId="68b7a22b-a3eb-4e08-a61f-646d81823754" providerId="ADAL" clId="{9429BEAE-70A6-4AEE-A37D-2075488C87F1}" dt="2023-09-03T13:10:07.529" v="421" actId="12"/>
-          <ac:spMkLst>
-            <pc:docMk/>
-            <pc:sldMk cId="1354391041" sldId="351"/>
-            <ac:spMk id="3" creationId="{E576E56F-510B-4E90-0C1A-D4C081ED7B3E}"/>
-          </ac:spMkLst>
-        </pc:spChg>
-      </pc:sldChg>
-      <pc:sldChg chg="addSp delSp modSp new mod">
-        <pc:chgData name="Samer Hasan Al Khatib" userId="68b7a22b-a3eb-4e08-a61f-646d81823754" providerId="ADAL" clId="{9429BEAE-70A6-4AEE-A37D-2075488C87F1}" dt="2023-09-03T13:12:08.849" v="429" actId="14100"/>
-        <pc:sldMkLst>
-          <pc:docMk/>
-          <pc:sldMk cId="423621241" sldId="352"/>
-        </pc:sldMkLst>
-        <pc:spChg chg="mod">
-          <ac:chgData name="Samer Hasan Al Khatib" userId="68b7a22b-a3eb-4e08-a61f-646d81823754" providerId="ADAL" clId="{9429BEAE-70A6-4AEE-A37D-2075488C87F1}" dt="2023-09-03T13:12:03.967" v="427" actId="27636"/>
-          <ac:spMkLst>
-            <pc:docMk/>
-            <pc:sldMk cId="423621241" sldId="352"/>
-            <ac:spMk id="2" creationId="{6BB4C01F-0651-CA65-45BD-E699106A3746}"/>
-          </ac:spMkLst>
-        </pc:spChg>
-        <pc:spChg chg="del">
-          <ac:chgData name="Samer Hasan Al Khatib" userId="68b7a22b-a3eb-4e08-a61f-646d81823754" providerId="ADAL" clId="{9429BEAE-70A6-4AEE-A37D-2075488C87F1}" dt="2023-09-03T13:11:53.670" v="424" actId="931"/>
-          <ac:spMkLst>
-            <pc:docMk/>
-            <pc:sldMk cId="423621241" sldId="352"/>
-            <ac:spMk id="3" creationId="{5B3CF384-CF8B-7D4B-E36C-2FB2FBE5D8F9}"/>
-          </ac:spMkLst>
-        </pc:spChg>
-        <pc:picChg chg="add mod">
-          <ac:chgData name="Samer Hasan Al Khatib" userId="68b7a22b-a3eb-4e08-a61f-646d81823754" providerId="ADAL" clId="{9429BEAE-70A6-4AEE-A37D-2075488C87F1}" dt="2023-09-03T13:12:08.849" v="429" actId="14100"/>
-          <ac:picMkLst>
-            <pc:docMk/>
-            <pc:sldMk cId="423621241" sldId="352"/>
-            <ac:picMk id="5" creationId="{2C452D49-8568-C355-FDC7-D6946D39B8D7}"/>
-          </ac:picMkLst>
-        </pc:picChg>
-      </pc:sldChg>
-      <pc:sldChg chg="modSp new mod">
-        <pc:chgData name="Samer Hasan Al Khatib" userId="68b7a22b-a3eb-4e08-a61f-646d81823754" providerId="ADAL" clId="{9429BEAE-70A6-4AEE-A37D-2075488C87F1}" dt="2023-09-04T13:09:58.246" v="858"/>
-        <pc:sldMkLst>
-          <pc:docMk/>
-          <pc:sldMk cId="3020274771" sldId="353"/>
-        </pc:sldMkLst>
-        <pc:spChg chg="mod">
-          <ac:chgData name="Samer Hasan Al Khatib" userId="68b7a22b-a3eb-4e08-a61f-646d81823754" providerId="ADAL" clId="{9429BEAE-70A6-4AEE-A37D-2075488C87F1}" dt="2023-09-04T12:51:32.361" v="479" actId="27636"/>
-          <ac:spMkLst>
-            <pc:docMk/>
-            <pc:sldMk cId="3020274771" sldId="353"/>
-            <ac:spMk id="2" creationId="{28AE98CE-5B1D-A537-5999-327A911553BA}"/>
-          </ac:spMkLst>
-        </pc:spChg>
-        <pc:spChg chg="mod">
-          <ac:chgData name="Samer Hasan Al Khatib" userId="68b7a22b-a3eb-4e08-a61f-646d81823754" providerId="ADAL" clId="{9429BEAE-70A6-4AEE-A37D-2075488C87F1}" dt="2023-09-04T13:09:58.246" v="858"/>
-          <ac:spMkLst>
-            <pc:docMk/>
-            <pc:sldMk cId="3020274771" sldId="353"/>
-            <ac:spMk id="3" creationId="{1AA7FC27-A99E-479F-26C8-C5C791C22577}"/>
-          </ac:spMkLst>
-        </pc:spChg>
-      </pc:sldChg>
-      <pc:sldChg chg="addSp delSp modSp new mod">
-        <pc:chgData name="Samer Hasan Al Khatib" userId="68b7a22b-a3eb-4e08-a61f-646d81823754" providerId="ADAL" clId="{9429BEAE-70A6-4AEE-A37D-2075488C87F1}" dt="2023-09-04T13:13:56.337" v="865" actId="207"/>
-        <pc:sldMkLst>
-          <pc:docMk/>
-          <pc:sldMk cId="2596499514" sldId="354"/>
-        </pc:sldMkLst>
-        <pc:spChg chg="del">
-          <ac:chgData name="Samer Hasan Al Khatib" userId="68b7a22b-a3eb-4e08-a61f-646d81823754" providerId="ADAL" clId="{9429BEAE-70A6-4AEE-A37D-2075488C87F1}" dt="2023-09-04T12:55:36.418" v="600" actId="478"/>
-          <ac:spMkLst>
-            <pc:docMk/>
-            <pc:sldMk cId="2596499514" sldId="354"/>
-            <ac:spMk id="2" creationId="{B3C19A7A-40C9-66C3-13AE-D42207B8B5C6}"/>
-          </ac:spMkLst>
-        </pc:spChg>
-        <pc:spChg chg="mod">
-          <ac:chgData name="Samer Hasan Al Khatib" userId="68b7a22b-a3eb-4e08-a61f-646d81823754" providerId="ADAL" clId="{9429BEAE-70A6-4AEE-A37D-2075488C87F1}" dt="2023-09-04T13:13:56.337" v="865" actId="207"/>
-          <ac:spMkLst>
-            <pc:docMk/>
-            <pc:sldMk cId="2596499514" sldId="354"/>
-            <ac:spMk id="3" creationId="{C6223808-11F8-D5BC-FCB6-035D60D609BE}"/>
-          </ac:spMkLst>
-        </pc:spChg>
-        <pc:spChg chg="add del">
-          <ac:chgData name="Samer Hasan Al Khatib" userId="68b7a22b-a3eb-4e08-a61f-646d81823754" providerId="ADAL" clId="{9429BEAE-70A6-4AEE-A37D-2075488C87F1}" dt="2023-09-04T12:56:07.662" v="611"/>
-          <ac:spMkLst>
-            <pc:docMk/>
-            <pc:sldMk cId="2596499514" sldId="354"/>
-            <ac:spMk id="4" creationId="{1683949A-D2A0-29FF-7556-4318304AEA9F}"/>
-          </ac:spMkLst>
-        </pc:spChg>
-        <pc:spChg chg="add del">
-          <ac:chgData name="Samer Hasan Al Khatib" userId="68b7a22b-a3eb-4e08-a61f-646d81823754" providerId="ADAL" clId="{9429BEAE-70A6-4AEE-A37D-2075488C87F1}" dt="2023-09-04T12:56:11.987" v="613"/>
-          <ac:spMkLst>
-            <pc:docMk/>
-            <pc:sldMk cId="2596499514" sldId="354"/>
-            <ac:spMk id="5" creationId="{76C4FE70-7816-E824-A98E-FC3D75EF1C48}"/>
-          </ac:spMkLst>
-        </pc:spChg>
-        <pc:spChg chg="add del mod">
-          <ac:chgData name="Samer Hasan Al Khatib" userId="68b7a22b-a3eb-4e08-a61f-646d81823754" providerId="ADAL" clId="{9429BEAE-70A6-4AEE-A37D-2075488C87F1}" dt="2023-09-04T12:56:27.818" v="620"/>
-          <ac:spMkLst>
-            <pc:docMk/>
-            <pc:sldMk cId="2596499514" sldId="354"/>
-            <ac:spMk id="6" creationId="{650BEAE8-E616-A578-9474-190AEA44CCA4}"/>
-          </ac:spMkLst>
-        </pc:spChg>
-        <pc:spChg chg="add del">
-          <ac:chgData name="Samer Hasan Al Khatib" userId="68b7a22b-a3eb-4e08-a61f-646d81823754" providerId="ADAL" clId="{9429BEAE-70A6-4AEE-A37D-2075488C87F1}" dt="2023-09-04T12:56:26.841" v="618"/>
-          <ac:spMkLst>
-            <pc:docMk/>
-            <pc:sldMk cId="2596499514" sldId="354"/>
-            <ac:spMk id="7" creationId="{13288BB5-17A8-FE96-7D3C-E2E5531B2C66}"/>
-          </ac:spMkLst>
-        </pc:spChg>
-      </pc:sldChg>
-      <pc:sldChg chg="modSp new mod">
-        <pc:chgData name="Samer Hasan Al Khatib" userId="68b7a22b-a3eb-4e08-a61f-646d81823754" providerId="ADAL" clId="{9429BEAE-70A6-4AEE-A37D-2075488C87F1}" dt="2023-09-05T12:57:38.121" v="996" actId="20577"/>
-        <pc:sldMkLst>
-          <pc:docMk/>
-          <pc:sldMk cId="3706671491" sldId="360"/>
-        </pc:sldMkLst>
-        <pc:spChg chg="mod">
-          <ac:chgData name="Samer Hasan Al Khatib" userId="68b7a22b-a3eb-4e08-a61f-646d81823754" providerId="ADAL" clId="{9429BEAE-70A6-4AEE-A37D-2075488C87F1}" dt="2023-09-05T12:47:00.242" v="869" actId="27636"/>
-          <ac:spMkLst>
-            <pc:docMk/>
-            <pc:sldMk cId="3706671491" sldId="360"/>
-            <ac:spMk id="2" creationId="{5CAB13CF-4481-B408-82E5-DDCC15217E52}"/>
-          </ac:spMkLst>
-        </pc:spChg>
-        <pc:spChg chg="mod">
-          <ac:chgData name="Samer Hasan Al Khatib" userId="68b7a22b-a3eb-4e08-a61f-646d81823754" providerId="ADAL" clId="{9429BEAE-70A6-4AEE-A37D-2075488C87F1}" dt="2023-09-05T12:57:38.121" v="996" actId="20577"/>
-          <ac:spMkLst>
-            <pc:docMk/>
-            <pc:sldMk cId="3706671491" sldId="360"/>
-            <ac:spMk id="3" creationId="{79D00269-B8FF-5997-D333-3901DA0CF476}"/>
-          </ac:spMkLst>
-        </pc:spChg>
-      </pc:sldChg>
-      <pc:sldChg chg="new del">
-        <pc:chgData name="Samer Hasan Al Khatib" userId="68b7a22b-a3eb-4e08-a61f-646d81823754" providerId="ADAL" clId="{9429BEAE-70A6-4AEE-A37D-2075488C87F1}" dt="2023-09-05T12:57:44.341" v="997" actId="2696"/>
-        <pc:sldMkLst>
-          <pc:docMk/>
-          <pc:sldMk cId="537569939" sldId="361"/>
-        </pc:sldMkLst>
-      </pc:sldChg>
-      <pc:sldChg chg="modSp new mod ord">
-        <pc:chgData name="Samer Hasan Al Khatib" userId="68b7a22b-a3eb-4e08-a61f-646d81823754" providerId="ADAL" clId="{9429BEAE-70A6-4AEE-A37D-2075488C87F1}" dt="2023-09-05T14:57:12.034" v="1127" actId="14100"/>
-        <pc:sldMkLst>
-          <pc:docMk/>
-          <pc:sldMk cId="2289709080" sldId="361"/>
-        </pc:sldMkLst>
-        <pc:spChg chg="mod">
-          <ac:chgData name="Samer Hasan Al Khatib" userId="68b7a22b-a3eb-4e08-a61f-646d81823754" providerId="ADAL" clId="{9429BEAE-70A6-4AEE-A37D-2075488C87F1}" dt="2023-09-05T14:54:52.814" v="1005" actId="20577"/>
-          <ac:spMkLst>
-            <pc:docMk/>
-            <pc:sldMk cId="2289709080" sldId="361"/>
-            <ac:spMk id="2" creationId="{A7E357CB-0FC9-38FE-FE05-A8C30658A8BF}"/>
-          </ac:spMkLst>
-        </pc:spChg>
-        <pc:spChg chg="mod">
-          <ac:chgData name="Samer Hasan Al Khatib" userId="68b7a22b-a3eb-4e08-a61f-646d81823754" providerId="ADAL" clId="{9429BEAE-70A6-4AEE-A37D-2075488C87F1}" dt="2023-09-05T14:57:12.034" v="1127" actId="14100"/>
-          <ac:spMkLst>
-            <pc:docMk/>
-            <pc:sldMk cId="2289709080" sldId="361"/>
-            <ac:spMk id="3" creationId="{8817443C-E7A2-BD59-4D90-FA737EC78E3F}"/>
-          </ac:spMkLst>
-        </pc:spChg>
-      </pc:sldChg>
-    </pc:docChg>
-  </pc:docChgLst>
-  <pc:docChgLst>
-    <pc:chgData name="Samer Hasan Al Khatib" userId="68b7a22b-a3eb-4e08-a61f-646d81823754" providerId="ADAL" clId="{AAED9A61-9B94-455C-9872-D686D363AB3A}"/>
-    <pc:docChg chg="custSel addSld modSld sldOrd">
-      <pc:chgData name="Samer Hasan Al Khatib" userId="68b7a22b-a3eb-4e08-a61f-646d81823754" providerId="ADAL" clId="{AAED9A61-9B94-455C-9872-D686D363AB3A}" dt="2023-08-23T13:55:50.614" v="102" actId="20577"/>
-      <pc:docMkLst>
-        <pc:docMk/>
-      </pc:docMkLst>
-      <pc:sldChg chg="modSp mod">
-        <pc:chgData name="Samer Hasan Al Khatib" userId="68b7a22b-a3eb-4e08-a61f-646d81823754" providerId="ADAL" clId="{AAED9A61-9B94-455C-9872-D686D363AB3A}" dt="2023-08-23T09:43:20.976" v="52" actId="20577"/>
-        <pc:sldMkLst>
-          <pc:docMk/>
-          <pc:sldMk cId="439875432" sldId="285"/>
-        </pc:sldMkLst>
-        <pc:spChg chg="mod">
-          <ac:chgData name="Samer Hasan Al Khatib" userId="68b7a22b-a3eb-4e08-a61f-646d81823754" providerId="ADAL" clId="{AAED9A61-9B94-455C-9872-D686D363AB3A}" dt="2023-08-23T09:43:20.976" v="52" actId="20577"/>
-          <ac:spMkLst>
-            <pc:docMk/>
-            <pc:sldMk cId="439875432" sldId="285"/>
-            <ac:spMk id="3" creationId="{E91B2835-7C5A-DA92-3031-9A45FABEA04E}"/>
-          </ac:spMkLst>
-        </pc:spChg>
-      </pc:sldChg>
-      <pc:sldChg chg="addSp delSp modSp new mod ord">
-        <pc:chgData name="Samer Hasan Al Khatib" userId="68b7a22b-a3eb-4e08-a61f-646d81823754" providerId="ADAL" clId="{AAED9A61-9B94-455C-9872-D686D363AB3A}" dt="2023-08-23T13:51:08.472" v="59" actId="14100"/>
-        <pc:sldMkLst>
-          <pc:docMk/>
-          <pc:sldMk cId="4143296048" sldId="295"/>
-        </pc:sldMkLst>
-        <pc:spChg chg="del">
-          <ac:chgData name="Samer Hasan Al Khatib" userId="68b7a22b-a3eb-4e08-a61f-646d81823754" providerId="ADAL" clId="{AAED9A61-9B94-455C-9872-D686D363AB3A}" dt="2023-08-23T13:51:01.460" v="56" actId="478"/>
-          <ac:spMkLst>
-            <pc:docMk/>
-            <pc:sldMk cId="4143296048" sldId="295"/>
-            <ac:spMk id="2" creationId="{16C03D72-3154-BB81-10D4-1BCDD6D15532}"/>
-          </ac:spMkLst>
-        </pc:spChg>
-        <pc:spChg chg="del">
-          <ac:chgData name="Samer Hasan Al Khatib" userId="68b7a22b-a3eb-4e08-a61f-646d81823754" providerId="ADAL" clId="{AAED9A61-9B94-455C-9872-D686D363AB3A}" dt="2023-08-23T13:51:02.568" v="57"/>
-          <ac:spMkLst>
-            <pc:docMk/>
-            <pc:sldMk cId="4143296048" sldId="295"/>
-            <ac:spMk id="3" creationId="{C58DE4E5-ADFE-8EAA-C089-CFDA95078712}"/>
-          </ac:spMkLst>
-        </pc:spChg>
-        <pc:picChg chg="add mod">
-          <ac:chgData name="Samer Hasan Al Khatib" userId="68b7a22b-a3eb-4e08-a61f-646d81823754" providerId="ADAL" clId="{AAED9A61-9B94-455C-9872-D686D363AB3A}" dt="2023-08-23T13:51:08.472" v="59" actId="14100"/>
-          <ac:picMkLst>
-            <pc:docMk/>
-            <pc:sldMk cId="4143296048" sldId="295"/>
-            <ac:picMk id="5" creationId="{24C2A4A6-CA57-A263-2AFF-6A3F0DF4A3E6}"/>
-          </ac:picMkLst>
-        </pc:picChg>
-      </pc:sldChg>
-      <pc:sldChg chg="addSp delSp modSp new mod">
-        <pc:chgData name="Samer Hasan Al Khatib" userId="68b7a22b-a3eb-4e08-a61f-646d81823754" providerId="ADAL" clId="{AAED9A61-9B94-455C-9872-D686D363AB3A}" dt="2023-08-23T13:52:18.905" v="68" actId="1076"/>
-        <pc:sldMkLst>
-          <pc:docMk/>
-          <pc:sldMk cId="1757098919" sldId="296"/>
-        </pc:sldMkLst>
-        <pc:spChg chg="del">
-          <ac:chgData name="Samer Hasan Al Khatib" userId="68b7a22b-a3eb-4e08-a61f-646d81823754" providerId="ADAL" clId="{AAED9A61-9B94-455C-9872-D686D363AB3A}" dt="2023-08-23T13:52:05.264" v="61"/>
-          <ac:spMkLst>
-            <pc:docMk/>
-            <pc:sldMk cId="1757098919" sldId="296"/>
-            <ac:spMk id="3" creationId="{8FDA4826-E8E2-C5CE-1258-AF544DA059A7}"/>
-          </ac:spMkLst>
-        </pc:spChg>
-        <pc:picChg chg="add mod">
-          <ac:chgData name="Samer Hasan Al Khatib" userId="68b7a22b-a3eb-4e08-a61f-646d81823754" providerId="ADAL" clId="{AAED9A61-9B94-455C-9872-D686D363AB3A}" dt="2023-08-23T13:52:18.905" v="68" actId="1076"/>
-          <ac:picMkLst>
-            <pc:docMk/>
-            <pc:sldMk cId="1757098919" sldId="296"/>
-            <ac:picMk id="5" creationId="{1122CE5F-44F7-41B1-F95D-B41132C1EF97}"/>
-          </ac:picMkLst>
-        </pc:picChg>
-      </pc:sldChg>
-      <pc:sldChg chg="modSp new mod">
-        <pc:chgData name="Samer Hasan Al Khatib" userId="68b7a22b-a3eb-4e08-a61f-646d81823754" providerId="ADAL" clId="{AAED9A61-9B94-455C-9872-D686D363AB3A}" dt="2023-08-23T13:55:50.614" v="102" actId="20577"/>
-        <pc:sldMkLst>
-          <pc:docMk/>
-          <pc:sldMk cId="1306180161" sldId="297"/>
-        </pc:sldMkLst>
-        <pc:spChg chg="mod">
-          <ac:chgData name="Samer Hasan Al Khatib" userId="68b7a22b-a3eb-4e08-a61f-646d81823754" providerId="ADAL" clId="{AAED9A61-9B94-455C-9872-D686D363AB3A}" dt="2023-08-23T13:55:50.614" v="102" actId="20577"/>
-          <ac:spMkLst>
-            <pc:docMk/>
-            <pc:sldMk cId="1306180161" sldId="297"/>
-            <ac:spMk id="2" creationId="{0BBDE87A-9285-9DA0-4319-0738CA221ED7}"/>
-          </ac:spMkLst>
-        </pc:spChg>
-      </pc:sldChg>
-    </pc:docChg>
-  </pc:docChgLst>
 </pc:chgInfo>
 </file>
 
@@ -2417,7 +2417,7 @@
           <a:p>
             <a:fld id="{B2A8D585-6054-42C6-91A2-25F89FD937BC}" type="datetimeFigureOut">
               <a:rPr lang="en-US" smtClean="0"/>
-              <a:t>9/5/2023</a:t>
+              <a:t>9/6/2023</a:t>
             </a:fld>
             <a:endParaRPr lang="en-US"/>
           </a:p>
@@ -2708,7 +2708,7 @@
           <a:p>
             <a:fld id="{B2A8D585-6054-42C6-91A2-25F89FD937BC}" type="datetimeFigureOut">
               <a:rPr lang="en-US" smtClean="0"/>
-              <a:t>9/5/2023</a:t>
+              <a:t>9/6/2023</a:t>
             </a:fld>
             <a:endParaRPr lang="en-US"/>
           </a:p>
@@ -2967,7 +2967,7 @@
           <a:p>
             <a:fld id="{B2A8D585-6054-42C6-91A2-25F89FD937BC}" type="datetimeFigureOut">
               <a:rPr lang="en-US" smtClean="0"/>
-              <a:t>9/5/2023</a:t>
+              <a:t>9/6/2023</a:t>
             </a:fld>
             <a:endParaRPr lang="en-US"/>
           </a:p>
@@ -3436,7 +3436,7 @@
           <a:p>
             <a:fld id="{B2A8D585-6054-42C6-91A2-25F89FD937BC}" type="datetimeFigureOut">
               <a:rPr lang="en-US" smtClean="0"/>
-              <a:t>9/5/2023</a:t>
+              <a:t>9/6/2023</a:t>
             </a:fld>
             <a:endParaRPr lang="en-US"/>
           </a:p>
@@ -3616,7 +3616,7 @@
           <a:p>
             <a:fld id="{B2A8D585-6054-42C6-91A2-25F89FD937BC}" type="datetimeFigureOut">
               <a:rPr lang="en-US" smtClean="0"/>
-              <a:t>9/5/2023</a:t>
+              <a:t>9/6/2023</a:t>
             </a:fld>
             <a:endParaRPr lang="en-US"/>
           </a:p>
@@ -4192,7 +4192,7 @@
           <a:p>
             <a:fld id="{B2A8D585-6054-42C6-91A2-25F89FD937BC}" type="datetimeFigureOut">
               <a:rPr lang="en-US" smtClean="0"/>
-              <a:t>9/5/2023</a:t>
+              <a:t>9/6/2023</a:t>
             </a:fld>
             <a:endParaRPr lang="en-US"/>
           </a:p>
@@ -4524,7 +4524,7 @@
           <a:p>
             <a:fld id="{B2A8D585-6054-42C6-91A2-25F89FD937BC}" type="datetimeFigureOut">
               <a:rPr lang="en-US" smtClean="0"/>
-              <a:t>9/5/2023</a:t>
+              <a:t>9/6/2023</a:t>
             </a:fld>
             <a:endParaRPr lang="en-US"/>
           </a:p>
@@ -4699,7 +4699,7 @@
           <a:p>
             <a:fld id="{B2A8D585-6054-42C6-91A2-25F89FD937BC}" type="datetimeFigureOut">
               <a:rPr lang="en-US" smtClean="0"/>
-              <a:t>9/5/2023</a:t>
+              <a:t>9/6/2023</a:t>
             </a:fld>
             <a:endParaRPr lang="en-US"/>
           </a:p>
@@ -4879,7 +4879,7 @@
           <a:p>
             <a:fld id="{B2A8D585-6054-42C6-91A2-25F89FD937BC}" type="datetimeFigureOut">
               <a:rPr lang="en-US" smtClean="0"/>
-              <a:t>9/5/2023</a:t>
+              <a:t>9/6/2023</a:t>
             </a:fld>
             <a:endParaRPr lang="en-US"/>
           </a:p>
@@ -5049,7 +5049,7 @@
           <a:p>
             <a:fld id="{B2A8D585-6054-42C6-91A2-25F89FD937BC}" type="datetimeFigureOut">
               <a:rPr lang="en-US" smtClean="0"/>
-              <a:t>9/5/2023</a:t>
+              <a:t>9/6/2023</a:t>
             </a:fld>
             <a:endParaRPr lang="en-US"/>
           </a:p>
@@ -5306,7 +5306,7 @@
           <a:p>
             <a:fld id="{B2A8D585-6054-42C6-91A2-25F89FD937BC}" type="datetimeFigureOut">
               <a:rPr lang="en-US" smtClean="0"/>
-              <a:t>9/5/2023</a:t>
+              <a:t>9/6/2023</a:t>
             </a:fld>
             <a:endParaRPr lang="en-US"/>
           </a:p>
@@ -5598,7 +5598,7 @@
           <a:p>
             <a:fld id="{B2A8D585-6054-42C6-91A2-25F89FD937BC}" type="datetimeFigureOut">
               <a:rPr lang="en-US" smtClean="0"/>
-              <a:t>9/5/2023</a:t>
+              <a:t>9/6/2023</a:t>
             </a:fld>
             <a:endParaRPr lang="en-US"/>
           </a:p>
@@ -6028,7 +6028,7 @@
           <a:p>
             <a:fld id="{B2A8D585-6054-42C6-91A2-25F89FD937BC}" type="datetimeFigureOut">
               <a:rPr lang="en-US" smtClean="0"/>
-              <a:t>9/5/2023</a:t>
+              <a:t>9/6/2023</a:t>
             </a:fld>
             <a:endParaRPr lang="en-US"/>
           </a:p>
@@ -6146,7 +6146,7 @@
           <a:p>
             <a:fld id="{B2A8D585-6054-42C6-91A2-25F89FD937BC}" type="datetimeFigureOut">
               <a:rPr lang="en-US" smtClean="0"/>
-              <a:t>9/5/2023</a:t>
+              <a:t>9/6/2023</a:t>
             </a:fld>
             <a:endParaRPr lang="en-US"/>
           </a:p>
@@ -6241,7 +6241,7 @@
           <a:p>
             <a:fld id="{B2A8D585-6054-42C6-91A2-25F89FD937BC}" type="datetimeFigureOut">
               <a:rPr lang="en-US" smtClean="0"/>
-              <a:t>9/5/2023</a:t>
+              <a:t>9/6/2023</a:t>
             </a:fld>
             <a:endParaRPr lang="en-US"/>
           </a:p>
@@ -6524,7 +6524,7 @@
           <a:p>
             <a:fld id="{B2A8D585-6054-42C6-91A2-25F89FD937BC}" type="datetimeFigureOut">
               <a:rPr lang="en-US" smtClean="0"/>
-              <a:t>9/5/2023</a:t>
+              <a:t>9/6/2023</a:t>
             </a:fld>
             <a:endParaRPr lang="en-US"/>
           </a:p>
@@ -6815,7 +6815,7 @@
           <a:p>
             <a:fld id="{B2A8D585-6054-42C6-91A2-25F89FD937BC}" type="datetimeFigureOut">
               <a:rPr lang="en-US" smtClean="0"/>
-              <a:t>9/5/2023</a:t>
+              <a:t>9/6/2023</a:t>
             </a:fld>
             <a:endParaRPr lang="en-US"/>
           </a:p>
@@ -7046,7 +7046,7 @@
           <a:p>
             <a:fld id="{B2A8D585-6054-42C6-91A2-25F89FD937BC}" type="datetimeFigureOut">
               <a:rPr lang="en-US" smtClean="0"/>
-              <a:t>9/5/2023</a:t>
+              <a:t>9/6/2023</a:t>
             </a:fld>
             <a:endParaRPr lang="en-US"/>
           </a:p>
@@ -25487,14 +25487,19 @@
             <p:ph type="title"/>
           </p:nvPr>
         </p:nvSpPr>
-        <p:spPr/>
+        <p:spPr>
+          <a:xfrm>
+            <a:off x="1141413" y="247290"/>
+            <a:ext cx="9905998" cy="796506"/>
+          </a:xfrm>
+        </p:spPr>
         <p:txBody>
           <a:bodyPr/>
           <a:lstStyle/>
           <a:p>
             <a:r>
               <a:rPr lang="en-US" dirty="0"/>
-              <a:t>Razor</a:t>
+              <a:t>MVC Pending Topics</a:t>
             </a:r>
           </a:p>
         </p:txBody>
@@ -25517,12 +25522,14 @@
         </p:nvSpPr>
         <p:spPr>
           <a:xfrm>
-            <a:off x="1141413" y="1871933"/>
-            <a:ext cx="9905998" cy="3919268"/>
+            <a:off x="1141413" y="1164566"/>
+            <a:ext cx="9905998" cy="7039153"/>
           </a:xfrm>
         </p:spPr>
         <p:txBody>
-          <a:bodyPr/>
+          <a:bodyPr>
+            <a:normAutofit/>
+          </a:bodyPr>
           <a:lstStyle/>
           <a:p>
             <a:r>
@@ -25538,32 +25545,66 @@
           </a:p>
           <a:p>
             <a:r>
-              <a:rPr lang="en-US" dirty="0" err="1"/>
-              <a:t>TagHelper</a:t>
-            </a:r>
+              <a:rPr lang="en-US" dirty="0"/>
+              <a:t>Tag Helper</a:t>
+            </a:r>
+          </a:p>
+          <a:p>
+            <a:r>
+              <a:rPr lang="en-US" dirty="0"/>
+              <a:t>Layout page (apply new Design)</a:t>
+            </a:r>
+          </a:p>
+          <a:p>
+            <a:r>
+              <a:rPr lang="en-US" dirty="0"/>
+              <a:t>Authentication &amp; Authorization</a:t>
+            </a:r>
+          </a:p>
+          <a:p>
+            <a:r>
+              <a:rPr lang="en-US" dirty="0"/>
+              <a:t>Master Detail Example.</a:t>
+            </a:r>
+          </a:p>
+          <a:p>
+            <a:r>
+              <a:rPr lang="en-US" dirty="0"/>
+              <a:t>Create Full Example with Scaffolding</a:t>
+            </a:r>
+          </a:p>
+          <a:p>
+            <a:r>
+              <a:rPr lang="en-US" dirty="0"/>
+              <a:t>EF With Stored Procedures &amp; SQL Views</a:t>
+            </a:r>
+          </a:p>
+          <a:p>
+            <a:r>
+              <a:rPr lang="en-US" dirty="0"/>
+              <a:t>Data Annotation for model</a:t>
+            </a:r>
+          </a:p>
+          <a:p>
+            <a:r>
+              <a:rPr lang="en-US" dirty="0"/>
+              <a:t>Upload file in asp.net core</a:t>
+            </a:r>
+          </a:p>
+          <a:p>
+            <a:r>
+              <a:rPr lang="en-US" dirty="0"/>
+              <a:t>Bind dropdown list</a:t>
+            </a:r>
+          </a:p>
+          <a:p>
             <a:endParaRPr lang="en-US" dirty="0"/>
           </a:p>
           <a:p>
-            <a:r>
-              <a:rPr lang="en-US" dirty="0"/>
-              <a:t>Layout page (apply new layout)</a:t>
-            </a:r>
-          </a:p>
-          <a:p>
-            <a:r>
-              <a:rPr lang="en-US" dirty="0" err="1"/>
-              <a:t>Authntaion</a:t>
-            </a:r>
-            <a:r>
-              <a:rPr lang="en-US" dirty="0"/>
-              <a:t> &amp; Authorization</a:t>
-            </a:r>
-          </a:p>
-          <a:p>
-            <a:r>
-              <a:rPr lang="en-US" dirty="0"/>
-              <a:t>Master Detail Example.</a:t>
-            </a:r>
+            <a:endParaRPr lang="en-US" dirty="0"/>
+          </a:p>
+          <a:p>
+            <a:endParaRPr lang="en-US" dirty="0"/>
           </a:p>
           <a:p>
             <a:endParaRPr lang="en-US" dirty="0"/>

</xml_diff>